<commit_message>
Commit con presentación de septiembre y video de app final
</commit_message>
<xml_diff>
--- a/Presentaciones/Presentación VASPA septiembre 2020/Presentación VASPA - Septiembre 2020.pptx
+++ b/Presentaciones/Presentación VASPA septiembre 2020/Presentación VASPA - Septiembre 2020.pptx
@@ -5,25 +5,29 @@
     <p:sldMasterId id="2147483933" r:id="rId1"/>
   </p:sldMasterIdLst>
   <p:notesMasterIdLst>
-    <p:notesMasterId r:id="rId18"/>
+    <p:notesMasterId r:id="rId22"/>
   </p:notesMasterIdLst>
   <p:sldIdLst>
     <p:sldId id="267" r:id="rId2"/>
     <p:sldId id="269" r:id="rId3"/>
     <p:sldId id="268" r:id="rId4"/>
-    <p:sldId id="354" r:id="rId5"/>
-    <p:sldId id="338" r:id="rId6"/>
-    <p:sldId id="339" r:id="rId7"/>
-    <p:sldId id="340" r:id="rId8"/>
+    <p:sldId id="372" r:id="rId5"/>
+    <p:sldId id="373" r:id="rId6"/>
+    <p:sldId id="338" r:id="rId7"/>
+    <p:sldId id="375" r:id="rId8"/>
     <p:sldId id="355" r:id="rId9"/>
     <p:sldId id="357" r:id="rId10"/>
-    <p:sldId id="358" r:id="rId11"/>
-    <p:sldId id="359" r:id="rId12"/>
-    <p:sldId id="290" r:id="rId13"/>
-    <p:sldId id="332" r:id="rId14"/>
-    <p:sldId id="350" r:id="rId15"/>
-    <p:sldId id="352" r:id="rId16"/>
-    <p:sldId id="275" r:id="rId17"/>
+    <p:sldId id="359" r:id="rId11"/>
+    <p:sldId id="361" r:id="rId12"/>
+    <p:sldId id="260" r:id="rId13"/>
+    <p:sldId id="362" r:id="rId14"/>
+    <p:sldId id="265" r:id="rId15"/>
+    <p:sldId id="367" r:id="rId16"/>
+    <p:sldId id="374" r:id="rId17"/>
+    <p:sldId id="369" r:id="rId18"/>
+    <p:sldId id="370" r:id="rId19"/>
+    <p:sldId id="371" r:id="rId20"/>
+    <p:sldId id="275" r:id="rId21"/>
   </p:sldIdLst>
   <p:sldSz cx="12192000" cy="6858000"/>
   <p:notesSz cx="6858000" cy="9144000"/>
@@ -141,6 +145,18 @@
 </p:presentation>
 </file>
 
+<file path=ppt/commentAuthors.xml><?xml version="1.0" encoding="utf-8"?>
+<p:cmAuthorLst xmlns:a="http://schemas.openxmlformats.org/drawingml/2006/main" xmlns:r="http://schemas.openxmlformats.org/officeDocument/2006/relationships" xmlns:p="http://schemas.openxmlformats.org/presentationml/2006/main">
+  <p:cmAuthor id="1" name="fabriciowgonzalez@hotmail.com" initials="f" lastIdx="1" clrIdx="0">
+    <p:extLst>
+      <p:ext uri="{19B8F6BF-5375-455C-9EA6-DF929625EA0E}">
+        <p15:presenceInfo xmlns:p15="http://schemas.microsoft.com/office/powerpoint/2012/main" userId="a164a6b8617c5e46" providerId="Windows Live"/>
+      </p:ext>
+    </p:extLst>
+  </p:cmAuthor>
+</p:cmAuthorLst>
+</file>
+
 <file path=ppt/charts/chart1.xml><?xml version="1.0" encoding="utf-8"?>
 <c:chartSpace xmlns:c="http://schemas.openxmlformats.org/drawingml/2006/chart" xmlns:a="http://schemas.openxmlformats.org/drawingml/2006/main" xmlns:r="http://schemas.openxmlformats.org/officeDocument/2006/relationships" xmlns:c16r2="http://schemas.microsoft.com/office/drawing/2015/06/chart">
   <c:date1904 val="0"/>
@@ -155,76 +171,7 @@
     </mc:Fallback>
   </mc:AlternateContent>
   <c:chart>
-    <c:title>
-      <c:tx>
-        <c:rich>
-          <a:bodyPr rot="0" spcFirstLastPara="1" vertOverflow="ellipsis" vert="horz" wrap="square" anchor="ctr" anchorCtr="1"/>
-          <a:lstStyle/>
-          <a:p>
-            <a:pPr>
-              <a:defRPr sz="1862" b="0" i="0" u="none" strike="noStrike" kern="1200" spc="0" baseline="0">
-                <a:solidFill>
-                  <a:schemeClr val="tx1">
-                    <a:lumMod val="65000"/>
-                    <a:lumOff val="35000"/>
-                  </a:schemeClr>
-                </a:solidFill>
-                <a:latin typeface="+mn-lt"/>
-                <a:ea typeface="+mn-ea"/>
-                <a:cs typeface="+mn-cs"/>
-              </a:defRPr>
-            </a:pPr>
-            <a:r>
-              <a:rPr lang="en-US" dirty="0"/>
-              <a:t>Estado de </a:t>
-            </a:r>
-            <a:r>
-              <a:rPr lang="en-US" dirty="0" err="1"/>
-              <a:t>los</a:t>
-            </a:r>
-            <a:r>
-              <a:rPr lang="en-US" dirty="0"/>
-              <a:t> </a:t>
-            </a:r>
-            <a:r>
-              <a:rPr lang="en-US" dirty="0" err="1"/>
-              <a:t>riesgos</a:t>
-            </a:r>
-            <a:endParaRPr lang="en-US" dirty="0"/>
-          </a:p>
-        </c:rich>
-      </c:tx>
-      <c:layout/>
-      <c:overlay val="0"/>
-      <c:spPr>
-        <a:noFill/>
-        <a:ln>
-          <a:noFill/>
-        </a:ln>
-        <a:effectLst/>
-      </c:spPr>
-      <c:txPr>
-        <a:bodyPr rot="0" spcFirstLastPara="1" vertOverflow="ellipsis" vert="horz" wrap="square" anchor="ctr" anchorCtr="1"/>
-        <a:lstStyle/>
-        <a:p>
-          <a:pPr>
-            <a:defRPr sz="1862" b="0" i="0" u="none" strike="noStrike" kern="1200" spc="0" baseline="0">
-              <a:solidFill>
-                <a:schemeClr val="tx1">
-                  <a:lumMod val="65000"/>
-                  <a:lumOff val="35000"/>
-                </a:schemeClr>
-              </a:solidFill>
-              <a:latin typeface="+mn-lt"/>
-              <a:ea typeface="+mn-ea"/>
-              <a:cs typeface="+mn-cs"/>
-            </a:defRPr>
-          </a:pPr>
-          <a:endParaRPr lang="en-US"/>
-        </a:p>
-      </c:txPr>
-    </c:title>
-    <c:autoTitleDeleted val="0"/>
+    <c:autoTitleDeleted val="1"/>
     <c:plotArea>
       <c:layout/>
       <c:pieChart>
@@ -238,7 +185,7 @@
               <c:strCache>
                 <c:ptCount val="1"/>
                 <c:pt idx="0">
-                  <c:v>Estados de los Riesgos</c:v>
+                  <c:v>Ventas</c:v>
                 </c:pt>
               </c:strCache>
             </c:strRef>
@@ -250,16 +197,24 @@
               <a:solidFill>
                 <a:schemeClr val="accent1"/>
               </a:solidFill>
-              <a:ln w="19050">
-                <a:solidFill>
-                  <a:schemeClr val="lt1"/>
-                </a:solidFill>
+              <a:ln>
+                <a:noFill/>
               </a:ln>
               <a:effectLst/>
+              <a:scene3d>
+                <a:camera prst="orthographicFront"/>
+                <a:lightRig rig="brightRoom" dir="t"/>
+              </a:scene3d>
+              <a:sp3d prstMaterial="flat">
+                <a:bevelT w="50800" h="101600" prst="angle"/>
+                <a:contourClr>
+                  <a:srgbClr val="000000"/>
+                </a:contourClr>
+              </a:sp3d>
             </c:spPr>
             <c:extLst>
               <c:ext xmlns:c16="http://schemas.microsoft.com/office/drawing/2014/chart" uri="{C3380CC4-5D6E-409C-BE32-E72D297353CC}">
-                <c16:uniqueId val="{00000001-92AC-41C0-9681-7C859D37E438}"/>
+                <c16:uniqueId val="{00000001-0AB8-4DB2-9333-585C3CF15C26}"/>
               </c:ext>
             </c:extLst>
           </c:dPt>
@@ -268,31 +223,153 @@
             <c:bubble3D val="0"/>
             <c:spPr>
               <a:solidFill>
-                <a:schemeClr val="accent2"/>
+                <a:schemeClr val="accent3"/>
               </a:solidFill>
-              <a:ln w="19050">
-                <a:solidFill>
-                  <a:schemeClr val="lt1"/>
-                </a:solidFill>
+              <a:ln>
+                <a:noFill/>
+              </a:ln>
+              <a:effectLst/>
+              <a:scene3d>
+                <a:camera prst="orthographicFront"/>
+                <a:lightRig rig="brightRoom" dir="t"/>
+              </a:scene3d>
+              <a:sp3d prstMaterial="flat">
+                <a:bevelT w="50800" h="101600" prst="angle"/>
+                <a:contourClr>
+                  <a:srgbClr val="000000"/>
+                </a:contourClr>
+              </a:sp3d>
+            </c:spPr>
+            <c:extLst>
+              <c:ext xmlns:c16="http://schemas.microsoft.com/office/drawing/2014/chart" uri="{C3380CC4-5D6E-409C-BE32-E72D297353CC}">
+                <c16:uniqueId val="{00000003-0AB8-4DB2-9333-585C3CF15C26}"/>
+              </c:ext>
+            </c:extLst>
+          </c:dPt>
+          <c:dPt>
+            <c:idx val="2"/>
+            <c:bubble3D val="0"/>
+            <c:spPr>
+              <a:solidFill>
+                <a:schemeClr val="accent5"/>
+              </a:solidFill>
+              <a:ln>
+                <a:noFill/>
+              </a:ln>
+              <a:effectLst/>
+              <a:scene3d>
+                <a:camera prst="orthographicFront"/>
+                <a:lightRig rig="brightRoom" dir="t"/>
+              </a:scene3d>
+              <a:sp3d prstMaterial="flat">
+                <a:bevelT w="50800" h="101600" prst="angle"/>
+                <a:contourClr>
+                  <a:srgbClr val="000000"/>
+                </a:contourClr>
+              </a:sp3d>
+            </c:spPr>
+            <c:extLst>
+              <c:ext xmlns:c16="http://schemas.microsoft.com/office/drawing/2014/chart" uri="{C3380CC4-5D6E-409C-BE32-E72D297353CC}">
+                <c16:uniqueId val="{00000005-0AB8-4DB2-9333-585C3CF15C26}"/>
+              </c:ext>
+            </c:extLst>
+          </c:dPt>
+          <c:dPt>
+            <c:idx val="3"/>
+            <c:bubble3D val="0"/>
+            <c:spPr>
+              <a:solidFill>
+                <a:schemeClr val="accent1">
+                  <a:lumMod val="60000"/>
+                </a:schemeClr>
+              </a:solidFill>
+              <a:ln>
+                <a:noFill/>
+              </a:ln>
+              <a:effectLst/>
+              <a:scene3d>
+                <a:camera prst="orthographicFront"/>
+                <a:lightRig rig="brightRoom" dir="t"/>
+              </a:scene3d>
+              <a:sp3d prstMaterial="flat">
+                <a:bevelT w="50800" h="101600" prst="angle"/>
+                <a:contourClr>
+                  <a:srgbClr val="000000"/>
+                </a:contourClr>
+              </a:sp3d>
+            </c:spPr>
+            <c:extLst>
+              <c:ext xmlns:c16="http://schemas.microsoft.com/office/drawing/2014/chart" uri="{C3380CC4-5D6E-409C-BE32-E72D297353CC}">
+                <c16:uniqueId val="{00000007-0AB8-4DB2-9333-585C3CF15C26}"/>
+              </c:ext>
+            </c:extLst>
+          </c:dPt>
+          <c:dLbls>
+            <c:spPr>
+              <a:noFill/>
+              <a:ln>
+                <a:noFill/>
               </a:ln>
               <a:effectLst/>
             </c:spPr>
+            <c:txPr>
+              <a:bodyPr rot="0" spcFirstLastPara="1" vertOverflow="ellipsis" vert="horz" wrap="square" lIns="38100" tIns="19050" rIns="38100" bIns="19050" anchor="ctr" anchorCtr="1">
+                <a:spAutoFit/>
+              </a:bodyPr>
+              <a:lstStyle/>
+              <a:p>
+                <a:pPr>
+                  <a:defRPr sz="1197" b="1" i="0" u="none" strike="noStrike" kern="1200" baseline="0">
+                    <a:solidFill>
+                      <a:schemeClr val="lt1"/>
+                    </a:solidFill>
+                    <a:latin typeface="+mn-lt"/>
+                    <a:ea typeface="+mn-ea"/>
+                    <a:cs typeface="+mn-cs"/>
+                  </a:defRPr>
+                </a:pPr>
+                <a:endParaRPr lang="es-AR"/>
+              </a:p>
+            </c:txPr>
+            <c:dLblPos val="inEnd"/>
+            <c:showLegendKey val="0"/>
+            <c:showVal val="0"/>
+            <c:showCatName val="0"/>
+            <c:showSerName val="0"/>
+            <c:showPercent val="1"/>
+            <c:showBubbleSize val="0"/>
+            <c:showLeaderLines val="1"/>
+            <c:leaderLines>
+              <c:spPr>
+                <a:ln w="9525" cap="flat" cmpd="sng" algn="ctr">
+                  <a:solidFill>
+                    <a:schemeClr val="tx1">
+                      <a:lumMod val="35000"/>
+                      <a:lumOff val="65000"/>
+                    </a:schemeClr>
+                  </a:solidFill>
+                  <a:round/>
+                </a:ln>
+                <a:effectLst/>
+              </c:spPr>
+            </c:leaderLines>
             <c:extLst>
-              <c:ext xmlns:c16="http://schemas.microsoft.com/office/drawing/2014/chart" uri="{C3380CC4-5D6E-409C-BE32-E72D297353CC}">
-                <c16:uniqueId val="{00000003-92AC-41C0-9681-7C859D37E438}"/>
-              </c:ext>
+              <c:ext xmlns:c15="http://schemas.microsoft.com/office/drawing/2012/chart" uri="{CE6537A1-D6FC-4f65-9D91-7224C49458BB}"/>
             </c:extLst>
-          </c:dPt>
+          </c:dLbls>
           <c:cat>
             <c:strRef>
               <c:f>Hoja1!$A$2:$A$5</c:f>
               <c:strCache>
-                <c:ptCount val="2"/>
+                <c:ptCount val="3"/>
                 <c:pt idx="0">
-                  <c:v>Activos</c:v>
+                  <c:v>Finalizados</c:v>
                 </c:pt>
                 <c:pt idx="1">
-                  <c:v>Cerrados</c:v>
+                  <c:v>Avanzados</c:v>
+                </c:pt>
+                <c:pt idx="2">
+                  <c:v>Incompletos</c:v>
                 </c:pt>
               </c:strCache>
             </c:strRef>
@@ -302,28 +379,32 @@
               <c:f>Hoja1!$B$2:$B$5</c:f>
               <c:numCache>
                 <c:formatCode>General</c:formatCode>
-                <c:ptCount val="2"/>
+                <c:ptCount val="4"/>
                 <c:pt idx="0">
-                  <c:v>6</c:v>
+                  <c:v>23</c:v>
                 </c:pt>
                 <c:pt idx="1">
-                  <c:v>11</c:v>
+                  <c:v>4</c:v>
+                </c:pt>
+                <c:pt idx="2">
+                  <c:v>1</c:v>
                 </c:pt>
               </c:numCache>
             </c:numRef>
           </c:val>
           <c:extLst>
             <c:ext xmlns:c16="http://schemas.microsoft.com/office/drawing/2014/chart" uri="{C3380CC4-5D6E-409C-BE32-E72D297353CC}">
-              <c16:uniqueId val="{00000000-1ABC-43B0-A04E-E78A647A0063}"/>
+              <c16:uniqueId val="{00000000-1316-4049-A5F6-94EDDDE1BDAF}"/>
             </c:ext>
           </c:extLst>
         </c:ser>
         <c:dLbls>
+          <c:dLblPos val="inEnd"/>
           <c:showLegendKey val="0"/>
           <c:showVal val="0"/>
           <c:showCatName val="0"/>
           <c:showSerName val="0"/>
-          <c:showPercent val="0"/>
+          <c:showPercent val="1"/>
           <c:showBubbleSize val="0"/>
           <c:showLeaderLines val="1"/>
         </c:dLbls>
@@ -338,8 +419,80 @@
       </c:spPr>
     </c:plotArea>
     <c:legend>
-      <c:legendPos val="b"/>
-      <c:layout/>
+      <c:legendPos val="t"/>
+      <c:legendEntry>
+        <c:idx val="0"/>
+        <c:txPr>
+          <a:bodyPr rot="0" spcFirstLastPara="1" vertOverflow="ellipsis" vert="horz" wrap="square" anchor="ctr" anchorCtr="1"/>
+          <a:lstStyle/>
+          <a:p>
+            <a:pPr>
+              <a:defRPr sz="1197" b="0" i="0" u="none" strike="noStrike" kern="1200" baseline="0">
+                <a:solidFill>
+                  <a:schemeClr val="tx1">
+                    <a:lumMod val="65000"/>
+                    <a:lumOff val="35000"/>
+                  </a:schemeClr>
+                </a:solidFill>
+                <a:latin typeface="+mn-lt"/>
+                <a:ea typeface="+mn-ea"/>
+                <a:cs typeface="+mn-cs"/>
+              </a:defRPr>
+            </a:pPr>
+            <a:endParaRPr lang="es-AR"/>
+          </a:p>
+        </c:txPr>
+      </c:legendEntry>
+      <c:legendEntry>
+        <c:idx val="1"/>
+        <c:txPr>
+          <a:bodyPr rot="0" spcFirstLastPara="1" vertOverflow="ellipsis" vert="horz" wrap="square" anchor="ctr" anchorCtr="1"/>
+          <a:lstStyle/>
+          <a:p>
+            <a:pPr>
+              <a:defRPr sz="1197" b="0" i="0" u="none" strike="noStrike" kern="1200" baseline="0">
+                <a:solidFill>
+                  <a:schemeClr val="tx1">
+                    <a:lumMod val="65000"/>
+                    <a:lumOff val="35000"/>
+                  </a:schemeClr>
+                </a:solidFill>
+                <a:latin typeface="+mn-lt"/>
+                <a:ea typeface="+mn-ea"/>
+                <a:cs typeface="+mn-cs"/>
+              </a:defRPr>
+            </a:pPr>
+            <a:endParaRPr lang="es-AR"/>
+          </a:p>
+        </c:txPr>
+      </c:legendEntry>
+      <c:legendEntry>
+        <c:idx val="2"/>
+        <c:txPr>
+          <a:bodyPr rot="0" spcFirstLastPara="1" vertOverflow="ellipsis" vert="horz" wrap="square" anchor="ctr" anchorCtr="1"/>
+          <a:lstStyle/>
+          <a:p>
+            <a:pPr>
+              <a:defRPr sz="1197" b="0" i="0" u="none" strike="noStrike" kern="1200" baseline="0">
+                <a:solidFill>
+                  <a:schemeClr val="tx1">
+                    <a:lumMod val="65000"/>
+                    <a:lumOff val="35000"/>
+                  </a:schemeClr>
+                </a:solidFill>
+                <a:latin typeface="+mn-lt"/>
+                <a:ea typeface="+mn-ea"/>
+                <a:cs typeface="+mn-cs"/>
+              </a:defRPr>
+            </a:pPr>
+            <a:endParaRPr lang="es-AR"/>
+          </a:p>
+        </c:txPr>
+      </c:legendEntry>
+      <c:legendEntry>
+        <c:idx val="3"/>
+        <c:delete val="1"/>
+      </c:legendEntry>
       <c:overlay val="0"/>
       <c:spPr>
         <a:noFill/>
@@ -365,7 +518,7 @@
               <a:cs typeface="+mn-cs"/>
             </a:defRPr>
           </a:pPr>
-          <a:endParaRPr lang="en-US"/>
+          <a:endParaRPr lang="es-AR"/>
         </a:p>
       </c:txPr>
     </c:legend>
@@ -387,7 +540,7 @@
       <a:pPr>
         <a:defRPr/>
       </a:pPr>
-      <a:endParaRPr lang="en-US"/>
+      <a:endParaRPr lang="es-AR"/>
     </a:p>
   </c:txPr>
   <c:externalData r:id="rId3">
@@ -397,13 +550,10 @@
 </file>
 
 <file path=ppt/charts/colors1.xml><?xml version="1.0" encoding="utf-8"?>
-<cs:colorStyle xmlns:cs="http://schemas.microsoft.com/office/drawing/2012/chartStyle" xmlns:a="http://schemas.openxmlformats.org/drawingml/2006/main" meth="cycle" id="10">
+<cs:colorStyle xmlns:cs="http://schemas.microsoft.com/office/drawing/2012/chartStyle" xmlns:a="http://schemas.openxmlformats.org/drawingml/2006/main" meth="cycle" id="11">
   <a:schemeClr val="accent1"/>
-  <a:schemeClr val="accent2"/>
   <a:schemeClr val="accent3"/>
-  <a:schemeClr val="accent4"/>
   <a:schemeClr val="accent5"/>
-  <a:schemeClr val="accent6"/>
   <cs:variation/>
   <cs:variation>
     <a:lumMod val="60000"/>
@@ -437,7 +587,7 @@
 </file>
 
 <file path=ppt/charts/style1.xml><?xml version="1.0" encoding="utf-8"?>
-<cs:chartStyle xmlns:cs="http://schemas.microsoft.com/office/drawing/2012/chartStyle" xmlns:a="http://schemas.openxmlformats.org/drawingml/2006/main" id="251">
+<cs:chartStyle xmlns:cs="http://schemas.microsoft.com/office/drawing/2012/chartStyle" xmlns:a="http://schemas.openxmlformats.org/drawingml/2006/main" id="258">
   <cs:axisTitle>
     <cs:lnRef idx="0"/>
     <cs:fillRef idx="0"/>
@@ -448,7 +598,7 @@
         <a:lumOff val="35000"/>
       </a:schemeClr>
     </cs:fontRef>
-    <cs:defRPr sz="1330" kern="1200"/>
+    <cs:defRPr sz="1197" kern="1200"/>
   </cs:axisTitle>
   <cs:categoryAxis>
     <cs:lnRef idx="0"/>
@@ -460,17 +610,6 @@
         <a:lumOff val="35000"/>
       </a:schemeClr>
     </cs:fontRef>
-    <cs:spPr>
-      <a:ln w="9525" cap="flat" cmpd="sng" algn="ctr">
-        <a:solidFill>
-          <a:schemeClr val="tx1">
-            <a:lumMod val="15000"/>
-            <a:lumOff val="85000"/>
-          </a:schemeClr>
-        </a:solidFill>
-        <a:round/>
-      </a:ln>
-    </cs:spPr>
     <cs:defRPr sz="1197" kern="1200"/>
   </cs:categoryAxis>
   <cs:chartArea mods="allowNoFillOverride allowNoLineOverride">
@@ -501,12 +640,9 @@
     <cs:fillRef idx="0"/>
     <cs:effectRef idx="0"/>
     <cs:fontRef idx="minor">
-      <a:schemeClr val="tx1">
-        <a:lumMod val="75000"/>
-        <a:lumOff val="25000"/>
-      </a:schemeClr>
+      <a:schemeClr val="lt1"/>
     </cs:fontRef>
-    <cs:defRPr sz="1197" kern="1200"/>
+    <cs:defRPr sz="1197" b="1" kern="1200"/>
   </cs:dataLabel>
   <cs:dataLabelCallout>
     <cs:lnRef idx="0"/>
@@ -538,7 +674,7 @@
   </cs:dataLabelCallout>
   <cs:dataPoint>
     <cs:lnRef idx="0"/>
-    <cs:fillRef idx="1">
+    <cs:fillRef idx="0">
       <cs:styleClr val="auto"/>
     </cs:fillRef>
     <cs:effectRef idx="0"/>
@@ -546,16 +682,24 @@
       <a:schemeClr val="tx1"/>
     </cs:fontRef>
     <cs:spPr>
-      <a:ln w="19050">
-        <a:solidFill>
-          <a:schemeClr val="lt1"/>
-        </a:solidFill>
-      </a:ln>
+      <a:solidFill>
+        <a:schemeClr val="phClr"/>
+      </a:solidFill>
+      <a:scene3d>
+        <a:camera prst="orthographicFront"/>
+        <a:lightRig rig="brightRoom" dir="t"/>
+      </a:scene3d>
+      <a:sp3d prstMaterial="flat">
+        <a:bevelT w="50800" h="101600" prst="angle"/>
+        <a:contourClr>
+          <a:srgbClr val="000000"/>
+        </a:contourClr>
+      </a:sp3d>
     </cs:spPr>
   </cs:dataPoint>
   <cs:dataPoint3D>
     <cs:lnRef idx="0"/>
-    <cs:fillRef idx="1">
+    <cs:fillRef idx="0">
       <cs:styleClr val="auto"/>
     </cs:fillRef>
     <cs:effectRef idx="0"/>
@@ -563,7 +707,10 @@
       <a:schemeClr val="tx1"/>
     </cs:fontRef>
     <cs:spPr>
-      <a:ln w="25400">
+      <a:solidFill>
+        <a:schemeClr val="phClr"/>
+      </a:solidFill>
+      <a:ln w="19050">
         <a:solidFill>
           <a:schemeClr val="lt1"/>
         </a:solidFill>
@@ -589,10 +736,8 @@
     </cs:spPr>
   </cs:dataPointLine>
   <cs:dataPointMarker>
-    <cs:lnRef idx="0">
-      <cs:styleClr val="auto"/>
-    </cs:lnRef>
-    <cs:fillRef idx="1">
+    <cs:lnRef idx="0"/>
+    <cs:fillRef idx="0">
       <cs:styleClr val="auto"/>
     </cs:fillRef>
     <cs:effectRef idx="0"/>
@@ -600,14 +745,17 @@
       <a:schemeClr val="tx1"/>
     </cs:fontRef>
     <cs:spPr>
+      <a:solidFill>
+        <a:schemeClr val="phClr"/>
+      </a:solidFill>
       <a:ln w="9525">
         <a:solidFill>
-          <a:schemeClr val="phClr"/>
+          <a:schemeClr val="lt1"/>
         </a:solidFill>
       </a:ln>
     </cs:spPr>
   </cs:dataPointMarker>
-  <cs:dataPointMarkerLayout symbol="circle" size="5"/>
+  <cs:dataPointMarkerLayout symbol="circle" size="6"/>
   <cs:dataPointWireframe>
     <cs:lnRef idx="0">
       <cs:styleClr val="auto"/>
@@ -872,7 +1020,7 @@
         <a:lumOff val="35000"/>
       </a:schemeClr>
     </cs:fontRef>
-    <cs:defRPr sz="1862" b="0" kern="1200" spc="0" baseline="0"/>
+    <cs:defRPr sz="1862" b="1" i="0" kern="1200" cap="all" spc="50" baseline="0"/>
   </cs:title>
   <cs:trendline>
     <cs:lnRef idx="0">
@@ -888,7 +1036,7 @@
         <a:solidFill>
           <a:schemeClr val="phClr"/>
         </a:solidFill>
-        <a:prstDash val="sysDot"/>
+        <a:prstDash val="sysDash"/>
       </a:ln>
     </cs:spPr>
   </cs:trendline>
@@ -1038,7 +1186,7 @@
             <a:fld id="{F55F861E-3C59-4235-9924-AE3FDF166F3F}" type="datetimeFigureOut">
               <a:rPr lang="es-AR" smtClean="0"/>
               <a:pPr/>
-              <a:t>13/9/2020</a:t>
+              <a:t>22/9/2020</a:t>
             </a:fld>
             <a:endParaRPr lang="es-AR"/>
           </a:p>
@@ -1305,91 +1453,6 @@
     </a:lvl9pPr>
   </p:notesStyle>
 </p:notesMaster>
-</file>
-
-<file path=ppt/notesSlides/notesSlide1.xml><?xml version="1.0" encoding="utf-8"?>
-<p:notes xmlns:a="http://schemas.openxmlformats.org/drawingml/2006/main" xmlns:r="http://schemas.openxmlformats.org/officeDocument/2006/relationships" xmlns:p="http://schemas.openxmlformats.org/presentationml/2006/main">
-  <p:cSld>
-    <p:spTree>
-      <p:nvGrpSpPr>
-        <p:cNvPr id="1" name=""/>
-        <p:cNvGrpSpPr/>
-        <p:nvPr/>
-      </p:nvGrpSpPr>
-      <p:grpSpPr>
-        <a:xfrm>
-          <a:off x="0" y="0"/>
-          <a:ext cx="0" cy="0"/>
-          <a:chOff x="0" y="0"/>
-          <a:chExt cx="0" cy="0"/>
-        </a:xfrm>
-      </p:grpSpPr>
-      <p:sp>
-        <p:nvSpPr>
-          <p:cNvPr id="2" name="Marcador de imagen de diapositiva 1"/>
-          <p:cNvSpPr>
-            <a:spLocks noGrp="1" noRot="1" noChangeAspect="1"/>
-          </p:cNvSpPr>
-          <p:nvPr>
-            <p:ph type="sldImg"/>
-          </p:nvPr>
-        </p:nvSpPr>
-        <p:spPr/>
-      </p:sp>
-      <p:sp>
-        <p:nvSpPr>
-          <p:cNvPr id="3" name="Marcador de notas 2"/>
-          <p:cNvSpPr>
-            <a:spLocks noGrp="1"/>
-          </p:cNvSpPr>
-          <p:nvPr>
-            <p:ph type="body" idx="1"/>
-          </p:nvPr>
-        </p:nvSpPr>
-        <p:spPr/>
-        <p:txBody>
-          <a:bodyPr/>
-          <a:lstStyle/>
-          <a:p>
-            <a:endParaRPr lang="en-US" dirty="0"/>
-          </a:p>
-        </p:txBody>
-      </p:sp>
-      <p:sp>
-        <p:nvSpPr>
-          <p:cNvPr id="4" name="Marcador de número de diapositiva 3"/>
-          <p:cNvSpPr>
-            <a:spLocks noGrp="1"/>
-          </p:cNvSpPr>
-          <p:nvPr>
-            <p:ph type="sldNum" sz="quarter" idx="10"/>
-          </p:nvPr>
-        </p:nvSpPr>
-        <p:spPr/>
-        <p:txBody>
-          <a:bodyPr/>
-          <a:lstStyle/>
-          <a:p>
-            <a:fld id="{E1AC5233-3CBA-4E20-A317-4FB9B1C96074}" type="slidenum">
-              <a:rPr lang="es-AR" smtClean="0"/>
-              <a:pPr/>
-              <a:t>10</a:t>
-            </a:fld>
-            <a:endParaRPr lang="es-AR"/>
-          </a:p>
-        </p:txBody>
-      </p:sp>
-    </p:spTree>
-    <p:extLst>
-      <p:ext uri="{BB962C8B-B14F-4D97-AF65-F5344CB8AC3E}">
-        <p14:creationId xmlns:p14="http://schemas.microsoft.com/office/powerpoint/2010/main" val="2782245804"/>
-      </p:ext>
-    </p:extLst>
-  </p:cSld>
-  <p:clrMapOvr>
-    <a:masterClrMapping/>
-  </p:clrMapOvr>
-</p:notes>
 </file>
 
 <file path=ppt/slideLayouts/slideLayout1.xml><?xml version="1.0" encoding="utf-8"?>
@@ -1895,7 +1958,7 @@
             <a:fld id="{59D4168E-E6F0-4E6D-9E98-0FBF44047F1D}" type="datetimeFigureOut">
               <a:rPr lang="es-AR" smtClean="0"/>
               <a:pPr/>
-              <a:t>13/9/2020</a:t>
+              <a:t>22/9/2020</a:t>
             </a:fld>
             <a:endParaRPr lang="es-AR"/>
           </a:p>
@@ -2229,7 +2292,7 @@
             <a:fld id="{59D4168E-E6F0-4E6D-9E98-0FBF44047F1D}" type="datetimeFigureOut">
               <a:rPr lang="es-AR" smtClean="0"/>
               <a:pPr/>
-              <a:t>13/9/2020</a:t>
+              <a:t>22/9/2020</a:t>
             </a:fld>
             <a:endParaRPr lang="es-AR"/>
           </a:p>
@@ -2479,7 +2542,7 @@
             <a:fld id="{59D4168E-E6F0-4E6D-9E98-0FBF44047F1D}" type="datetimeFigureOut">
               <a:rPr lang="es-AR" smtClean="0"/>
               <a:pPr/>
-              <a:t>13/9/2020</a:t>
+              <a:t>22/9/2020</a:t>
             </a:fld>
             <a:endParaRPr lang="es-AR"/>
           </a:p>
@@ -3021,7 +3084,7 @@
             <a:fld id="{59D4168E-E6F0-4E6D-9E98-0FBF44047F1D}" type="datetimeFigureOut">
               <a:rPr lang="es-AR" smtClean="0"/>
               <a:pPr/>
-              <a:t>13/9/2020</a:t>
+              <a:t>22/9/2020</a:t>
             </a:fld>
             <a:endParaRPr lang="es-AR"/>
           </a:p>
@@ -3271,7 +3334,7 @@
             <a:fld id="{59D4168E-E6F0-4E6D-9E98-0FBF44047F1D}" type="datetimeFigureOut">
               <a:rPr lang="es-AR" smtClean="0"/>
               <a:pPr/>
-              <a:t>13/9/2020</a:t>
+              <a:t>22/9/2020</a:t>
             </a:fld>
             <a:endParaRPr lang="es-AR"/>
           </a:p>
@@ -3805,7 +3868,7 @@
             <a:fld id="{59D4168E-E6F0-4E6D-9E98-0FBF44047F1D}" type="datetimeFigureOut">
               <a:rPr lang="es-AR" smtClean="0"/>
               <a:pPr/>
-              <a:t>13/9/2020</a:t>
+              <a:t>22/9/2020</a:t>
             </a:fld>
             <a:endParaRPr lang="es-AR"/>
           </a:p>
@@ -4104,7 +4167,7 @@
             <a:fld id="{59D4168E-E6F0-4E6D-9E98-0FBF44047F1D}" type="datetimeFigureOut">
               <a:rPr lang="es-AR" smtClean="0"/>
               <a:pPr/>
-              <a:t>13/9/2020</a:t>
+              <a:t>22/9/2020</a:t>
             </a:fld>
             <a:endParaRPr lang="es-AR"/>
           </a:p>
@@ -4280,7 +4343,7 @@
             <a:fld id="{59D4168E-E6F0-4E6D-9E98-0FBF44047F1D}" type="datetimeFigureOut">
               <a:rPr lang="es-AR" smtClean="0"/>
               <a:pPr/>
-              <a:t>13/9/2020</a:t>
+              <a:t>22/9/2020</a:t>
             </a:fld>
             <a:endParaRPr lang="es-AR"/>
           </a:p>
@@ -4462,7 +4525,7 @@
             <a:fld id="{59D4168E-E6F0-4E6D-9E98-0FBF44047F1D}" type="datetimeFigureOut">
               <a:rPr lang="es-AR" smtClean="0"/>
               <a:pPr/>
-              <a:t>13/9/2020</a:t>
+              <a:t>22/9/2020</a:t>
             </a:fld>
             <a:endParaRPr lang="es-AR"/>
           </a:p>
@@ -4640,7 +4703,7 @@
             <a:fld id="{59D4168E-E6F0-4E6D-9E98-0FBF44047F1D}" type="datetimeFigureOut">
               <a:rPr lang="es-AR" smtClean="0"/>
               <a:pPr/>
-              <a:t>13/9/2020</a:t>
+              <a:t>22/9/2020</a:t>
             </a:fld>
             <a:endParaRPr lang="es-AR"/>
           </a:p>
@@ -4929,7 +4992,7 @@
             <a:fld id="{59D4168E-E6F0-4E6D-9E98-0FBF44047F1D}" type="datetimeFigureOut">
               <a:rPr lang="es-AR" smtClean="0"/>
               <a:pPr/>
-              <a:t>13/9/2020</a:t>
+              <a:t>22/9/2020</a:t>
             </a:fld>
             <a:endParaRPr lang="es-AR"/>
           </a:p>
@@ -5228,7 +5291,7 @@
             <a:fld id="{59D4168E-E6F0-4E6D-9E98-0FBF44047F1D}" type="datetimeFigureOut">
               <a:rPr lang="es-AR" smtClean="0"/>
               <a:pPr/>
-              <a:t>13/9/2020</a:t>
+              <a:t>22/9/2020</a:t>
             </a:fld>
             <a:endParaRPr lang="es-AR"/>
           </a:p>
@@ -5672,7 +5735,7 @@
             <a:fld id="{59D4168E-E6F0-4E6D-9E98-0FBF44047F1D}" type="datetimeFigureOut">
               <a:rPr lang="es-AR" smtClean="0"/>
               <a:pPr/>
-              <a:t>13/9/2020</a:t>
+              <a:t>22/9/2020</a:t>
             </a:fld>
             <a:endParaRPr lang="es-AR"/>
           </a:p>
@@ -5792,7 +5855,7 @@
             <a:fld id="{59D4168E-E6F0-4E6D-9E98-0FBF44047F1D}" type="datetimeFigureOut">
               <a:rPr lang="es-AR" smtClean="0"/>
               <a:pPr/>
-              <a:t>13/9/2020</a:t>
+              <a:t>22/9/2020</a:t>
             </a:fld>
             <a:endParaRPr lang="es-AR"/>
           </a:p>
@@ -5889,7 +5952,7 @@
             <a:fld id="{59D4168E-E6F0-4E6D-9E98-0FBF44047F1D}" type="datetimeFigureOut">
               <a:rPr lang="es-AR" smtClean="0"/>
               <a:pPr/>
-              <a:t>13/9/2020</a:t>
+              <a:t>22/9/2020</a:t>
             </a:fld>
             <a:endParaRPr lang="es-AR"/>
           </a:p>
@@ -6174,7 +6237,7 @@
             <a:fld id="{59D4168E-E6F0-4E6D-9E98-0FBF44047F1D}" type="datetimeFigureOut">
               <a:rPr lang="es-AR" smtClean="0"/>
               <a:pPr/>
-              <a:t>13/9/2020</a:t>
+              <a:t>22/9/2020</a:t>
             </a:fld>
             <a:endParaRPr lang="es-AR"/>
           </a:p>
@@ -6467,7 +6530,7 @@
             <a:fld id="{59D4168E-E6F0-4E6D-9E98-0FBF44047F1D}" type="datetimeFigureOut">
               <a:rPr lang="es-AR" smtClean="0"/>
               <a:pPr/>
-              <a:t>13/9/2020</a:t>
+              <a:t>22/9/2020</a:t>
             </a:fld>
             <a:endParaRPr lang="es-AR"/>
           </a:p>
@@ -6999,7 +7062,7 @@
             <a:fld id="{59D4168E-E6F0-4E6D-9E98-0FBF44047F1D}" type="datetimeFigureOut">
               <a:rPr lang="es-AR" smtClean="0"/>
               <a:pPr/>
-              <a:t>13/9/2020</a:t>
+              <a:t>22/9/2020</a:t>
             </a:fld>
             <a:endParaRPr lang="es-AR"/>
           </a:p>
@@ -7558,14 +7621,11 @@
           <a:lstStyle/>
           <a:p>
             <a:r>
-              <a:rPr lang="es-AR" dirty="0" smtClean="0">
+              <a:rPr lang="es-AR" dirty="0">
                 <a:latin typeface="Georgia" panose="02040502050405020303" pitchFamily="18" charset="0"/>
               </a:rPr>
               <a:t>Sistema VASPA</a:t>
             </a:r>
-            <a:endParaRPr lang="es-AR" dirty="0">
-              <a:latin typeface="Georgia" panose="02040502050405020303" pitchFamily="18" charset="0"/>
-            </a:endParaRPr>
           </a:p>
         </p:txBody>
       </p:sp>
@@ -7598,14 +7658,11 @@
           <a:lstStyle/>
           <a:p>
             <a:r>
-              <a:rPr lang="es-AR" dirty="0" smtClean="0">
+              <a:rPr lang="es-AR" dirty="0">
                 <a:latin typeface="Georgia" panose="02040502050405020303" pitchFamily="18" charset="0"/>
               </a:rPr>
               <a:t>Laboratorio de Desarrollo de Software</a:t>
             </a:r>
-            <a:endParaRPr lang="es-AR" dirty="0">
-              <a:latin typeface="Georgia" panose="02040502050405020303" pitchFamily="18" charset="0"/>
-            </a:endParaRPr>
           </a:p>
         </p:txBody>
       </p:sp>
@@ -7728,296 +7785,10 @@
   <p:clrMapOvr>
     <a:masterClrMapping/>
   </p:clrMapOvr>
-  <p:timing>
-    <p:tnLst>
-      <p:par>
-        <p:cTn id="1" dur="indefinite" restart="never" nodeType="tmRoot"/>
-      </p:par>
-    </p:tnLst>
-  </p:timing>
 </p:sld>
 </file>
 
 <file path=ppt/slides/slide10.xml><?xml version="1.0" encoding="utf-8"?>
-<p:sld xmlns:a="http://schemas.openxmlformats.org/drawingml/2006/main" xmlns:r="http://schemas.openxmlformats.org/officeDocument/2006/relationships" xmlns:p="http://schemas.openxmlformats.org/presentationml/2006/main">
-  <p:cSld>
-    <p:spTree>
-      <p:nvGrpSpPr>
-        <p:cNvPr id="1" name=""/>
-        <p:cNvGrpSpPr/>
-        <p:nvPr/>
-      </p:nvGrpSpPr>
-      <p:grpSpPr>
-        <a:xfrm>
-          <a:off x="0" y="0"/>
-          <a:ext cx="0" cy="0"/>
-          <a:chOff x="0" y="0"/>
-          <a:chExt cx="0" cy="0"/>
-        </a:xfrm>
-      </p:grpSpPr>
-      <p:sp>
-        <p:nvSpPr>
-          <p:cNvPr id="6" name="Título 1"/>
-          <p:cNvSpPr txBox="1">
-            <a:spLocks/>
-          </p:cNvSpPr>
-          <p:nvPr/>
-        </p:nvSpPr>
-        <p:spPr>
-          <a:xfrm>
-            <a:off x="1947244" y="559293"/>
-            <a:ext cx="10018713" cy="1003076"/>
-          </a:xfrm>
-          <a:prstGeom prst="rect">
-            <a:avLst/>
-          </a:prstGeom>
-          <a:effectLst/>
-        </p:spPr>
-        <p:txBody>
-          <a:bodyPr vert="horz" lIns="91440" tIns="45720" rIns="91440" bIns="45720" rtlCol="0" anchor="b">
-            <a:normAutofit lnSpcReduction="10000"/>
-          </a:bodyPr>
-          <a:lstStyle>
-            <a:lvl1pPr algn="r" defTabSz="457200" rtl="0" eaLnBrk="1" latinLnBrk="0" hangingPunct="1">
-              <a:spcBef>
-                <a:spcPct val="0"/>
-              </a:spcBef>
-              <a:buNone/>
-              <a:defRPr sz="6000" kern="1200" cap="none">
-                <a:ln w="3175" cmpd="sng">
-                  <a:noFill/>
-                </a:ln>
-                <a:solidFill>
-                  <a:schemeClr val="tx1"/>
-                </a:solidFill>
-                <a:effectLst/>
-                <a:latin typeface="+mj-lt"/>
-                <a:ea typeface="+mj-ea"/>
-                <a:cs typeface="+mj-cs"/>
-              </a:defRPr>
-            </a:lvl1pPr>
-            <a:lvl2pPr eaLnBrk="1" hangingPunct="1">
-              <a:defRPr>
-                <a:solidFill>
-                  <a:schemeClr val="tx2"/>
-                </a:solidFill>
-              </a:defRPr>
-            </a:lvl2pPr>
-            <a:lvl3pPr eaLnBrk="1" hangingPunct="1">
-              <a:defRPr>
-                <a:solidFill>
-                  <a:schemeClr val="tx2"/>
-                </a:solidFill>
-              </a:defRPr>
-            </a:lvl3pPr>
-            <a:lvl4pPr eaLnBrk="1" hangingPunct="1">
-              <a:defRPr>
-                <a:solidFill>
-                  <a:schemeClr val="tx2"/>
-                </a:solidFill>
-              </a:defRPr>
-            </a:lvl4pPr>
-            <a:lvl5pPr eaLnBrk="1" hangingPunct="1">
-              <a:defRPr>
-                <a:solidFill>
-                  <a:schemeClr val="tx2"/>
-                </a:solidFill>
-              </a:defRPr>
-            </a:lvl5pPr>
-            <a:lvl6pPr eaLnBrk="1" hangingPunct="1">
-              <a:defRPr>
-                <a:solidFill>
-                  <a:schemeClr val="tx2"/>
-                </a:solidFill>
-              </a:defRPr>
-            </a:lvl6pPr>
-            <a:lvl7pPr eaLnBrk="1" hangingPunct="1">
-              <a:defRPr>
-                <a:solidFill>
-                  <a:schemeClr val="tx2"/>
-                </a:solidFill>
-              </a:defRPr>
-            </a:lvl7pPr>
-            <a:lvl8pPr eaLnBrk="1" hangingPunct="1">
-              <a:defRPr>
-                <a:solidFill>
-                  <a:schemeClr val="tx2"/>
-                </a:solidFill>
-              </a:defRPr>
-            </a:lvl8pPr>
-            <a:lvl9pPr eaLnBrk="1" hangingPunct="1">
-              <a:defRPr>
-                <a:solidFill>
-                  <a:schemeClr val="tx2"/>
-                </a:solidFill>
-              </a:defRPr>
-            </a:lvl9pPr>
-          </a:lstStyle>
-          <a:p>
-            <a:r>
-              <a:rPr lang="es-ES" sz="4800" dirty="0" smtClean="0"/>
-              <a:t>Estado del sistema – vista por actor II</a:t>
-            </a:r>
-            <a:r>
-              <a:rPr lang="es-ES" dirty="0" smtClean="0"/>
-              <a:t>	</a:t>
-            </a:r>
-            <a:endParaRPr lang="en-US" dirty="0"/>
-          </a:p>
-        </p:txBody>
-      </p:sp>
-      <p:sp>
-        <p:nvSpPr>
-          <p:cNvPr id="10" name="4 CuadroTexto"/>
-          <p:cNvSpPr txBox="1"/>
-          <p:nvPr/>
-        </p:nvSpPr>
-        <p:spPr>
-          <a:xfrm>
-            <a:off x="3613212" y="2246120"/>
-            <a:ext cx="5450889" cy="2308324"/>
-          </a:xfrm>
-          <a:prstGeom prst="rect">
-            <a:avLst/>
-          </a:prstGeom>
-          <a:noFill/>
-        </p:spPr>
-        <p:txBody>
-          <a:bodyPr wrap="square" rtlCol="0">
-            <a:spAutoFit/>
-          </a:bodyPr>
-          <a:lstStyle/>
-          <a:p>
-            <a:r>
-              <a:rPr lang="es-AR" dirty="0" smtClean="0">
-                <a:latin typeface="Georgia" panose="02040502050405020303" pitchFamily="18" charset="0"/>
-              </a:rPr>
-              <a:t>4 Casos de Uso:</a:t>
-            </a:r>
-          </a:p>
-          <a:p>
-            <a:pPr marL="285750" indent="-285750">
-              <a:buFont typeface="Arial" panose="020B0604020202020204" pitchFamily="34" charset="0"/>
-              <a:buChar char="•"/>
-            </a:pPr>
-            <a:r>
-              <a:rPr lang="es-AR" dirty="0" smtClean="0">
-                <a:latin typeface="Georgia" panose="02040502050405020303" pitchFamily="18" charset="0"/>
-              </a:rPr>
-              <a:t>Gestionar Programa</a:t>
-            </a:r>
-          </a:p>
-          <a:p>
-            <a:pPr marL="285750" indent="-285750">
-              <a:buFont typeface="Arial" panose="020B0604020202020204" pitchFamily="34" charset="0"/>
-              <a:buChar char="•"/>
-            </a:pPr>
-            <a:r>
-              <a:rPr lang="es-AR" dirty="0" smtClean="0">
-                <a:latin typeface="Georgia" panose="02040502050405020303" pitchFamily="18" charset="0"/>
-              </a:rPr>
-              <a:t>Gestionar Bibliografía</a:t>
-            </a:r>
-          </a:p>
-          <a:p>
-            <a:pPr marL="285750" indent="-285750">
-              <a:buFont typeface="Arial" panose="020B0604020202020204" pitchFamily="34" charset="0"/>
-              <a:buChar char="•"/>
-            </a:pPr>
-            <a:r>
-              <a:rPr lang="es-AR" dirty="0" smtClean="0">
-                <a:latin typeface="Georgia" panose="02040502050405020303" pitchFamily="18" charset="0"/>
-              </a:rPr>
-              <a:t>Enviar notificación</a:t>
-            </a:r>
-          </a:p>
-          <a:p>
-            <a:pPr marL="285750" indent="-285750">
-              <a:buFont typeface="Arial" panose="020B0604020202020204" pitchFamily="34" charset="0"/>
-              <a:buChar char="•"/>
-            </a:pPr>
-            <a:r>
-              <a:rPr lang="es-AR" dirty="0" smtClean="0">
-                <a:latin typeface="Georgia" panose="02040502050405020303" pitchFamily="18" charset="0"/>
-              </a:rPr>
-              <a:t>Generar Programa PDF</a:t>
-            </a:r>
-          </a:p>
-          <a:p>
-            <a:endParaRPr lang="es-AR" dirty="0" smtClean="0">
-              <a:latin typeface="Georgia" panose="02040502050405020303" pitchFamily="18" charset="0"/>
-            </a:endParaRPr>
-          </a:p>
-          <a:p>
-            <a:r>
-              <a:rPr lang="es-AR" dirty="0" smtClean="0">
-                <a:latin typeface="Georgia" panose="02040502050405020303" pitchFamily="18" charset="0"/>
-              </a:rPr>
-              <a:t>Los 4 CU se encuentran cerrados. Implementados y probados</a:t>
-            </a:r>
-          </a:p>
-        </p:txBody>
-      </p:sp>
-      <p:sp>
-        <p:nvSpPr>
-          <p:cNvPr id="11" name="Rectángulo 10"/>
-          <p:cNvSpPr/>
-          <p:nvPr/>
-        </p:nvSpPr>
-        <p:spPr>
-          <a:xfrm>
-            <a:off x="5041898" y="1650616"/>
-            <a:ext cx="3554461" cy="400110"/>
-          </a:xfrm>
-          <a:prstGeom prst="rect">
-            <a:avLst/>
-          </a:prstGeom>
-        </p:spPr>
-        <p:txBody>
-          <a:bodyPr wrap="square">
-            <a:spAutoFit/>
-          </a:bodyPr>
-          <a:lstStyle/>
-          <a:p>
-            <a:r>
-              <a:rPr lang="es-AR" sz="2000" dirty="0" smtClean="0">
-                <a:latin typeface="Georgia" panose="02040502050405020303" pitchFamily="18" charset="0"/>
-              </a:rPr>
-              <a:t>Actor: </a:t>
-            </a:r>
-            <a:r>
-              <a:rPr lang="es-AR" sz="2000" b="1" dirty="0" smtClean="0">
-                <a:latin typeface="Georgia" panose="02040502050405020303" pitchFamily="18" charset="0"/>
-              </a:rPr>
-              <a:t>Profesor</a:t>
-            </a:r>
-            <a:endParaRPr lang="es-AR" sz="2000" b="1" dirty="0">
-              <a:latin typeface="Georgia" panose="02040502050405020303" pitchFamily="18" charset="0"/>
-            </a:endParaRPr>
-          </a:p>
-        </p:txBody>
-      </p:sp>
-    </p:spTree>
-    <p:extLst>
-      <p:ext uri="{BB962C8B-B14F-4D97-AF65-F5344CB8AC3E}">
-        <p14:creationId xmlns:p14="http://schemas.microsoft.com/office/powerpoint/2010/main" val="3042447649"/>
-      </p:ext>
-    </p:extLst>
-  </p:cSld>
-  <p:clrMapOvr>
-    <a:masterClrMapping/>
-  </p:clrMapOvr>
-  <p:timing>
-    <p:tnLst>
-      <p:par>
-        <p:cTn id="1" dur="indefinite" restart="never" nodeType="tmRoot"/>
-      </p:par>
-    </p:tnLst>
-  </p:timing>
-</p:sld>
-</file>
-
-<file path=ppt/slides/slide11.xml><?xml version="1.0" encoding="utf-8"?>
 <p:sld xmlns:a="http://schemas.openxmlformats.org/drawingml/2006/main" xmlns:r="http://schemas.openxmlformats.org/officeDocument/2006/relationships" xmlns:p="http://schemas.openxmlformats.org/presentationml/2006/main">
   <p:cSld>
     <p:spTree>
@@ -8070,13 +7841,62 @@
   <p:clrMapOvr>
     <a:masterClrMapping/>
   </p:clrMapOvr>
-  <p:timing>
-    <p:tnLst>
-      <p:par>
-        <p:cTn id="1" dur="indefinite" restart="never" nodeType="tmRoot"/>
-      </p:par>
-    </p:tnLst>
-  </p:timing>
+</p:sld>
+</file>
+
+<file path=ppt/slides/slide11.xml><?xml version="1.0" encoding="utf-8"?>
+<p:sld xmlns:a="http://schemas.openxmlformats.org/drawingml/2006/main" xmlns:r="http://schemas.openxmlformats.org/officeDocument/2006/relationships" xmlns:p="http://schemas.openxmlformats.org/presentationml/2006/main">
+  <p:cSld>
+    <p:spTree>
+      <p:nvGrpSpPr>
+        <p:cNvPr id="1" name=""/>
+        <p:cNvGrpSpPr/>
+        <p:nvPr/>
+      </p:nvGrpSpPr>
+      <p:grpSpPr>
+        <a:xfrm>
+          <a:off x="0" y="0"/>
+          <a:ext cx="0" cy="0"/>
+          <a:chOff x="0" y="0"/>
+          <a:chExt cx="0" cy="0"/>
+        </a:xfrm>
+      </p:grpSpPr>
+      <p:pic>
+        <p:nvPicPr>
+          <p:cNvPr id="3" name="Picture 2" descr="C:\xampp\htdocs\vaspa\Elaboración\Diagramas de CU segun actor\Empleado SA\Diagrama de CU Empleado SA_1.jpg"/>
+          <p:cNvPicPr>
+            <a:picLocks noChangeAspect="1" noChangeArrowheads="1"/>
+          </p:cNvPicPr>
+          <p:nvPr/>
+        </p:nvPicPr>
+        <p:blipFill>
+          <a:blip r:embed="rId2" cstate="print"/>
+          <a:srcRect/>
+          <a:stretch>
+            <a:fillRect/>
+          </a:stretch>
+        </p:blipFill>
+        <p:spPr bwMode="auto">
+          <a:xfrm>
+            <a:off x="1" y="0"/>
+            <a:ext cx="12192000" cy="6858000"/>
+          </a:xfrm>
+          <a:prstGeom prst="rect">
+            <a:avLst/>
+          </a:prstGeom>
+          <a:noFill/>
+        </p:spPr>
+      </p:pic>
+    </p:spTree>
+    <p:extLst>
+      <p:ext uri="{BB962C8B-B14F-4D97-AF65-F5344CB8AC3E}">
+        <p14:creationId xmlns:p14="http://schemas.microsoft.com/office/powerpoint/2010/main" val="985429203"/>
+      </p:ext>
+    </p:extLst>
+  </p:cSld>
+  <p:clrMapOvr>
+    <a:masterClrMapping/>
+  </p:clrMapOvr>
 </p:sld>
 </file>
 
@@ -8097,89 +7917,37 @@
           <a:chExt cx="0" cy="0"/>
         </a:xfrm>
       </p:grpSpPr>
-      <p:sp>
-        <p:nvSpPr>
-          <p:cNvPr id="2" name="Título 1">
-            <a:extLst>
-              <a:ext uri="{FF2B5EF4-FFF2-40B4-BE49-F238E27FC236}">
-                <a16:creationId xmlns:a16="http://schemas.microsoft.com/office/drawing/2014/main" id="{CAF4FE63-0F55-4EEF-8842-BB6A3638AF69}"/>
-              </a:ext>
-            </a:extLst>
-          </p:cNvPr>
-          <p:cNvSpPr>
-            <a:spLocks noGrp="1"/>
-          </p:cNvSpPr>
-          <p:nvPr>
-            <p:ph type="title"/>
-          </p:nvPr>
-        </p:nvSpPr>
-        <p:spPr>
+      <p:pic>
+        <p:nvPicPr>
+          <p:cNvPr id="4" name="Picture 2" descr="C:\xampp\htdocs\vaspa\Elaboración\Diagramas de CU segun actor\Empleado SA\Diagrama de CU Empleado SA_2.jpg"/>
+          <p:cNvPicPr>
+            <a:picLocks noChangeAspect="1" noChangeArrowheads="1"/>
+          </p:cNvPicPr>
+          <p:nvPr/>
+        </p:nvPicPr>
+        <p:blipFill>
+          <a:blip r:embed="rId2" cstate="print"/>
+          <a:srcRect/>
+          <a:stretch>
+            <a:fillRect/>
+          </a:stretch>
+        </p:blipFill>
+        <p:spPr bwMode="auto">
           <a:xfrm>
-            <a:off x="1484310" y="460717"/>
-            <a:ext cx="10018713" cy="1752599"/>
+            <a:off x="0" y="-89647"/>
+            <a:ext cx="12192000" cy="6947647"/>
           </a:xfrm>
+          <a:prstGeom prst="rect">
+            <a:avLst/>
+          </a:prstGeom>
+          <a:noFill/>
         </p:spPr>
-        <p:txBody>
-          <a:bodyPr/>
-          <a:lstStyle/>
-          <a:p>
-            <a:r>
-              <a:rPr lang="es-AR" dirty="0" smtClean="0"/>
-              <a:t>Convergencia de estimaciones</a:t>
-            </a:r>
-            <a:endParaRPr lang="es-AR" dirty="0"/>
-          </a:p>
-        </p:txBody>
-      </p:sp>
-      <p:sp>
-        <p:nvSpPr>
-          <p:cNvPr id="3" name="Marcador de contenido 2">
-            <a:extLst>
-              <a:ext uri="{FF2B5EF4-FFF2-40B4-BE49-F238E27FC236}">
-                <a16:creationId xmlns:a16="http://schemas.microsoft.com/office/drawing/2014/main" id="{7C013F95-5617-4D6D-B332-E32197B1B877}"/>
-              </a:ext>
-            </a:extLst>
-          </p:cNvPr>
-          <p:cNvSpPr>
-            <a:spLocks noGrp="1"/>
-          </p:cNvSpPr>
-          <p:nvPr>
-            <p:ph idx="1"/>
-          </p:nvPr>
-        </p:nvSpPr>
-        <p:spPr>
-          <a:xfrm>
-            <a:off x="1484310" y="1484280"/>
-            <a:ext cx="10018713" cy="4329332"/>
-          </a:xfrm>
-        </p:spPr>
-        <p:txBody>
-          <a:bodyPr>
-            <a:normAutofit/>
-          </a:bodyPr>
-          <a:lstStyle/>
-          <a:p>
-            <a:endParaRPr lang="es-AR" dirty="0"/>
-          </a:p>
-        </p:txBody>
-      </p:sp>
+      </p:pic>
     </p:spTree>
-    <p:extLst>
-      <p:ext uri="{BB962C8B-B14F-4D97-AF65-F5344CB8AC3E}">
-        <p14:creationId xmlns:p14="http://schemas.microsoft.com/office/powerpoint/2010/main" val="1323728016"/>
-      </p:ext>
-    </p:extLst>
   </p:cSld>
   <p:clrMapOvr>
     <a:masterClrMapping/>
   </p:clrMapOvr>
-  <p:timing>
-    <p:tnLst>
-      <p:par>
-        <p:cTn id="1" dur="indefinite" restart="never" nodeType="tmRoot"/>
-      </p:par>
-    </p:tnLst>
-  </p:timing>
 </p:sld>
 </file>
 
@@ -8200,76 +7968,42 @@
           <a:chExt cx="0" cy="0"/>
         </a:xfrm>
       </p:grpSpPr>
-      <p:sp>
-        <p:nvSpPr>
-          <p:cNvPr id="2" name="Título 1"/>
-          <p:cNvSpPr>
-            <a:spLocks noGrp="1"/>
-          </p:cNvSpPr>
-          <p:nvPr>
-            <p:ph type="title"/>
-          </p:nvPr>
-        </p:nvSpPr>
-        <p:spPr>
-          <a:xfrm>
-            <a:off x="1484311" y="-185055"/>
-            <a:ext cx="10018713" cy="1752599"/>
-          </a:xfrm>
-        </p:spPr>
-        <p:txBody>
-          <a:bodyPr/>
-          <a:lstStyle/>
-          <a:p>
-            <a:r>
-              <a:rPr lang="es-AR" dirty="0"/>
-              <a:t>Gestión de Riesgos I - Riesgos a futuro</a:t>
-            </a:r>
-          </a:p>
-        </p:txBody>
-      </p:sp>
       <p:pic>
         <p:nvPicPr>
-          <p:cNvPr id="4" name="Marcador de contenido 3"/>
+          <p:cNvPr id="7" name="Picture 2" descr="C:\xampp\htdocs\vaspa\Elaboración\Diagramas de CU segun actor\Departamento\Diagrama de CU Departamento.jpg"/>
           <p:cNvPicPr>
-            <a:picLocks noGrp="1" noChangeAspect="1"/>
+            <a:picLocks noChangeAspect="1" noChangeArrowheads="1"/>
           </p:cNvPicPr>
-          <p:nvPr>
-            <p:ph idx="1"/>
-          </p:nvPr>
+          <p:nvPr/>
         </p:nvPicPr>
         <p:blipFill>
           <a:blip r:embed="rId2" cstate="print"/>
+          <a:srcRect/>
           <a:stretch>
             <a:fillRect/>
           </a:stretch>
         </p:blipFill>
-        <p:spPr>
+        <p:spPr bwMode="auto">
           <a:xfrm>
-            <a:off x="2038126" y="1494970"/>
-            <a:ext cx="10021721" cy="4920344"/>
+            <a:off x="1" y="1"/>
+            <a:ext cx="12192000" cy="6858000"/>
           </a:xfrm>
           <a:prstGeom prst="rect">
             <a:avLst/>
           </a:prstGeom>
+          <a:noFill/>
         </p:spPr>
       </p:pic>
     </p:spTree>
     <p:extLst>
       <p:ext uri="{BB962C8B-B14F-4D97-AF65-F5344CB8AC3E}">
-        <p14:creationId xmlns:p14="http://schemas.microsoft.com/office/powerpoint/2010/main" val="3954742130"/>
+        <p14:creationId xmlns:p14="http://schemas.microsoft.com/office/powerpoint/2010/main" val="2135117205"/>
       </p:ext>
     </p:extLst>
   </p:cSld>
   <p:clrMapOvr>
     <a:masterClrMapping/>
   </p:clrMapOvr>
-  <p:timing>
-    <p:tnLst>
-      <p:par>
-        <p:cTn id="1" dur="indefinite" restart="never" nodeType="tmRoot"/>
-      </p:par>
-    </p:tnLst>
-  </p:timing>
 </p:sld>
 </file>
 
@@ -8290,144 +8024,37 @@
           <a:chExt cx="0" cy="0"/>
         </a:xfrm>
       </p:grpSpPr>
-      <p:sp>
-        <p:nvSpPr>
-          <p:cNvPr id="2" name="Título 1"/>
-          <p:cNvSpPr>
-            <a:spLocks noGrp="1"/>
-          </p:cNvSpPr>
-          <p:nvPr>
-            <p:ph type="title"/>
-          </p:nvPr>
-        </p:nvSpPr>
-        <p:spPr>
+      <p:pic>
+        <p:nvPicPr>
+          <p:cNvPr id="7170" name="Picture 2" descr="C:\xampp\htdocs\vaspa\Elaboración\Diagramas de CU segun actor\Administrador\Diagrama de CU Administrador.jpg"/>
+          <p:cNvPicPr>
+            <a:picLocks noChangeAspect="1" noChangeArrowheads="1"/>
+          </p:cNvPicPr>
+          <p:nvPr/>
+        </p:nvPicPr>
+        <p:blipFill>
+          <a:blip r:embed="rId2" cstate="print"/>
+          <a:srcRect/>
+          <a:stretch>
+            <a:fillRect/>
+          </a:stretch>
+        </p:blipFill>
+        <p:spPr bwMode="auto">
           <a:xfrm>
-            <a:off x="1484311" y="20776"/>
-            <a:ext cx="10018713" cy="1752599"/>
+            <a:off x="0" y="1504"/>
+            <a:ext cx="12192001" cy="6856496"/>
           </a:xfrm>
+          <a:prstGeom prst="rect">
+            <a:avLst/>
+          </a:prstGeom>
+          <a:noFill/>
         </p:spPr>
-        <p:txBody>
-          <a:bodyPr/>
-          <a:lstStyle/>
-          <a:p>
-            <a:r>
-              <a:rPr lang="es-AR" dirty="0"/>
-              <a:t>Gestión de Riesgos II</a:t>
-            </a:r>
-          </a:p>
-        </p:txBody>
-      </p:sp>
-      <p:sp>
-        <p:nvSpPr>
-          <p:cNvPr id="3" name="Marcador de contenido 2"/>
-          <p:cNvSpPr>
-            <a:spLocks noGrp="1"/>
-          </p:cNvSpPr>
-          <p:nvPr>
-            <p:ph idx="1"/>
-          </p:nvPr>
-        </p:nvSpPr>
-        <p:spPr>
-          <a:xfrm>
-            <a:off x="1484310" y="609606"/>
-            <a:ext cx="10018713" cy="4405745"/>
-          </a:xfrm>
-        </p:spPr>
-        <p:txBody>
-          <a:bodyPr>
-            <a:normAutofit/>
-          </a:bodyPr>
-          <a:lstStyle/>
-          <a:p>
-            <a:pPr marL="0" indent="0">
-              <a:buNone/>
-            </a:pPr>
-            <a:r>
-              <a:rPr lang="es-AR" b="1" dirty="0"/>
-              <a:t>Estado de los riesgos :</a:t>
-            </a:r>
-          </a:p>
-          <a:p>
-            <a:pPr lvl="1"/>
-            <a:r>
-              <a:rPr lang="es-AR" dirty="0"/>
-              <a:t>Riesgos totales 17:</a:t>
-            </a:r>
-          </a:p>
-          <a:p>
-            <a:pPr lvl="2"/>
-            <a:r>
-              <a:rPr lang="es-AR" dirty="0"/>
-              <a:t>De los cuales 6 se encuentran </a:t>
-            </a:r>
-            <a:r>
-              <a:rPr lang="es-AR" i="1" dirty="0"/>
-              <a:t>activos</a:t>
-            </a:r>
-            <a:r>
-              <a:rPr lang="es-AR" dirty="0"/>
-              <a:t>.</a:t>
-            </a:r>
-          </a:p>
-          <a:p>
-            <a:pPr lvl="2"/>
-            <a:r>
-              <a:rPr lang="es-AR" dirty="0"/>
-              <a:t>Los 11 restantes se encuentra en el estado </a:t>
-            </a:r>
-            <a:r>
-              <a:rPr lang="es-AR" i="1" dirty="0"/>
-              <a:t>cerrado</a:t>
-            </a:r>
-            <a:r>
-              <a:rPr lang="es-AR" dirty="0"/>
-              <a:t>. </a:t>
-            </a:r>
-          </a:p>
-          <a:p>
-            <a:endParaRPr lang="es-AR" dirty="0"/>
-          </a:p>
-        </p:txBody>
-      </p:sp>
-      <p:graphicFrame>
-        <p:nvGraphicFramePr>
-          <p:cNvPr id="6" name="Gráfico 5"/>
-          <p:cNvGraphicFramePr/>
-          <p:nvPr>
-            <p:extLst>
-              <p:ext uri="{D42A27DB-BD31-4B8C-83A1-F6EECF244321}">
-                <p14:modId xmlns:p14="http://schemas.microsoft.com/office/powerpoint/2010/main" val="2955110295"/>
-              </p:ext>
-            </p:extLst>
-          </p:nvPr>
-        </p:nvGraphicFramePr>
-        <p:xfrm>
-          <a:off x="5458690" y="2064328"/>
-          <a:ext cx="8132619" cy="4503496"/>
-        </p:xfrm>
-        <a:graphic>
-          <a:graphicData uri="http://schemas.openxmlformats.org/drawingml/2006/chart">
-            <c:chart xmlns:c="http://schemas.openxmlformats.org/drawingml/2006/chart" xmlns:r="http://schemas.openxmlformats.org/officeDocument/2006/relationships" r:id="rId2"/>
-          </a:graphicData>
-        </a:graphic>
-      </p:graphicFrame>
+      </p:pic>
     </p:spTree>
-    <p:extLst>
-      <p:ext uri="{BB962C8B-B14F-4D97-AF65-F5344CB8AC3E}">
-        <p14:creationId xmlns:p14="http://schemas.microsoft.com/office/powerpoint/2010/main" val="1735037010"/>
-      </p:ext>
-    </p:extLst>
   </p:cSld>
   <p:clrMapOvr>
     <a:masterClrMapping/>
   </p:clrMapOvr>
-  <p:timing>
-    <p:tnLst>
-      <p:par>
-        <p:cTn id="1" dur="indefinite" restart="never" nodeType="tmRoot"/>
-      </p:par>
-    </p:tnLst>
-  </p:timing>
 </p:sld>
 </file>
 
@@ -8450,7 +8077,7 @@
       </p:grpSpPr>
       <p:sp>
         <p:nvSpPr>
-          <p:cNvPr id="2" name="Título 1"/>
+          <p:cNvPr id="2" name="1 Título"/>
           <p:cNvSpPr>
             <a:spLocks noGrp="1"/>
           </p:cNvSpPr>
@@ -8460,24 +8087,33 @@
         </p:nvSpPr>
         <p:spPr>
           <a:xfrm>
-            <a:off x="1484311" y="20776"/>
+            <a:off x="1598611" y="85725"/>
             <a:ext cx="10018713" cy="1752599"/>
           </a:xfrm>
         </p:spPr>
         <p:txBody>
-          <a:bodyPr/>
+          <a:bodyPr>
+            <a:normAutofit/>
+          </a:bodyPr>
           <a:lstStyle/>
           <a:p>
             <a:r>
-              <a:rPr lang="es-AR" dirty="0"/>
-              <a:t>Gestión de Riesgos III</a:t>
-            </a:r>
-          </a:p>
-        </p:txBody>
-      </p:sp>
-      <p:sp>
-        <p:nvSpPr>
-          <p:cNvPr id="3" name="Marcador de contenido 2"/>
+              <a:rPr lang="es-ES" sz="4400" dirty="0">
+                <a:latin typeface="Georgia" panose="02040502050405020303" pitchFamily="18" charset="0"/>
+              </a:rPr>
+              <a:t>Estado del Sistema – Resumen</a:t>
+            </a:r>
+            <a:r>
+              <a:rPr lang="es-ES" dirty="0"/>
+              <a:t>	</a:t>
+            </a:r>
+            <a:endParaRPr lang="en-US" dirty="0"/>
+          </a:p>
+        </p:txBody>
+      </p:sp>
+      <p:sp>
+        <p:nvSpPr>
+          <p:cNvPr id="3" name="2 Marcador de contenido"/>
           <p:cNvSpPr>
             <a:spLocks noGrp="1"/>
           </p:cNvSpPr>
@@ -8487,135 +8123,117 @@
         </p:nvSpPr>
         <p:spPr>
           <a:xfrm>
-            <a:off x="1484310" y="1870372"/>
-            <a:ext cx="10018713" cy="4405745"/>
+            <a:off x="1598611" y="2257425"/>
+            <a:ext cx="10018713" cy="3381375"/>
           </a:xfrm>
         </p:spPr>
         <p:txBody>
           <a:bodyPr>
-            <a:normAutofit fontScale="85000" lnSpcReduction="20000"/>
+            <a:noAutofit/>
           </a:bodyPr>
           <a:lstStyle/>
           <a:p>
-            <a:pPr marL="0" indent="0">
-              <a:buNone/>
+            <a:r>
+              <a:rPr lang="es-AR" sz="1800" dirty="0">
+                <a:latin typeface="Georgia" panose="02040502050405020303" pitchFamily="18" charset="0"/>
+              </a:rPr>
+              <a:t>De un total de 21 Casos de Uso:</a:t>
+            </a:r>
+          </a:p>
+          <a:p>
+            <a:pPr marL="285750" indent="-285750">
+              <a:buFont typeface="Arial" panose="020B0604020202020204" pitchFamily="34" charset="0"/>
+              <a:buChar char="•"/>
             </a:pPr>
             <a:r>
-              <a:rPr lang="es-AR" b="1" dirty="0"/>
-              <a:t>Estado de algunos riesgos :</a:t>
-            </a:r>
-          </a:p>
-          <a:p>
-            <a:r>
-              <a:rPr lang="es-AR" b="1" dirty="0"/>
-              <a:t>Activos</a:t>
-            </a:r>
-          </a:p>
-          <a:p>
-            <a:pPr lvl="1"/>
-            <a:r>
-              <a:rPr lang="es-ES" dirty="0"/>
-              <a:t>Complejidad técnica en la solución del problema en cuanto a la Generación del programa en PDF con PHP.</a:t>
-            </a:r>
-          </a:p>
-          <a:p>
-            <a:pPr lvl="1"/>
-            <a:r>
-              <a:rPr lang="es-ES" dirty="0"/>
-              <a:t>Tener que modificar el código fuente debido a cambios en la BD.</a:t>
-            </a:r>
-          </a:p>
-          <a:p>
-            <a:pPr lvl="1"/>
-            <a:r>
-              <a:rPr lang="es-ES" dirty="0"/>
-              <a:t>Algunos de los integrantes consiga trabajo.</a:t>
-            </a:r>
-          </a:p>
-          <a:p>
-            <a:pPr lvl="1"/>
-            <a:r>
-              <a:rPr lang="es-ES" dirty="0"/>
-              <a:t>No se realicen reuniones con el equipo docente para mostrar avances del proyecto.</a:t>
-            </a:r>
-          </a:p>
-          <a:p>
-            <a:pPr lvl="1"/>
-            <a:endParaRPr lang="es-AR" dirty="0"/>
-          </a:p>
-          <a:p>
-            <a:r>
-              <a:rPr lang="es-AR" b="1" dirty="0"/>
-              <a:t>Cerrados</a:t>
-            </a:r>
-            <a:r>
-              <a:rPr lang="es-AR" dirty="0"/>
-              <a:t> </a:t>
-            </a:r>
-          </a:p>
-          <a:p>
-            <a:pPr lvl="1"/>
-            <a:r>
-              <a:rPr lang="es-ES" dirty="0"/>
-              <a:t>Falta de experiencia de dos de los integrantes en el lenguaje PHP.</a:t>
-            </a:r>
-          </a:p>
-          <a:p>
-            <a:pPr lvl="1"/>
-            <a:r>
-              <a:rPr lang="es-ES" dirty="0"/>
-              <a:t>Tener problemas para llegar a un acuerdo sobre el Modelo de Datos con el Grupo 1.</a:t>
-            </a:r>
-          </a:p>
-          <a:p>
-            <a:pPr lvl="1"/>
-            <a:r>
-              <a:rPr lang="es-ES" dirty="0"/>
-              <a:t>Falta de utilización de las herramientas </a:t>
-            </a:r>
-            <a:r>
-              <a:rPr lang="es-ES" dirty="0" err="1"/>
-              <a:t>Git</a:t>
-            </a:r>
-            <a:r>
-              <a:rPr lang="es-ES" dirty="0"/>
-              <a:t> y GitHub.</a:t>
-            </a:r>
-          </a:p>
-          <a:p>
-            <a:pPr lvl="1"/>
-            <a:r>
-              <a:rPr lang="es-AR" dirty="0"/>
-              <a:t>No se lleven a cabo reuniones entre los integrantes.</a:t>
-            </a:r>
-            <a:endParaRPr lang="es-ES" dirty="0"/>
-          </a:p>
-          <a:p>
-            <a:pPr lvl="1"/>
-            <a:endParaRPr lang="es-AR" dirty="0"/>
-          </a:p>
-          <a:p>
-            <a:endParaRPr lang="es-AR" dirty="0"/>
+              <a:rPr lang="es-AR" sz="1800" dirty="0">
+                <a:latin typeface="Georgia" panose="02040502050405020303" pitchFamily="18" charset="0"/>
+              </a:rPr>
+              <a:t>19 se encuentran cerrados </a:t>
+            </a:r>
+          </a:p>
+          <a:p>
+            <a:endParaRPr lang="es-AR" sz="1800" dirty="0">
+              <a:latin typeface="Georgia" panose="02040502050405020303" pitchFamily="18" charset="0"/>
+            </a:endParaRPr>
+          </a:p>
+          <a:p>
+            <a:pPr marL="285750" indent="-285750">
+              <a:buFont typeface="Arial" panose="020B0604020202020204" pitchFamily="34" charset="0"/>
+              <a:buChar char="•"/>
+            </a:pPr>
+            <a:r>
+              <a:rPr lang="es-AR" sz="1800" dirty="0">
+                <a:latin typeface="Georgia" panose="02040502050405020303" pitchFamily="18" charset="0"/>
+              </a:rPr>
+              <a:t>2 se encuentran abiertos</a:t>
+            </a:r>
+          </a:p>
+          <a:p>
+            <a:pPr marL="742950" lvl="1" indent="-285750">
+              <a:buFont typeface="Arial" panose="020B0604020202020204" pitchFamily="34" charset="0"/>
+              <a:buChar char="•"/>
+            </a:pPr>
+            <a:r>
+              <a:rPr lang="es-AR" sz="1800" dirty="0">
+                <a:latin typeface="Georgia" panose="02040502050405020303" pitchFamily="18" charset="0"/>
+              </a:rPr>
+              <a:t>CU Generar Informe Gerencial </a:t>
+            </a:r>
+            <a:r>
+              <a:rPr lang="es-AR" sz="1800" dirty="0">
+                <a:latin typeface="Georgia" panose="02040502050405020303" pitchFamily="18" charset="0"/>
+                <a:sym typeface="Wingdings" panose="05000000000000000000" pitchFamily="2" charset="2"/>
+              </a:rPr>
+              <a:t> aún no aprobado por el cliente</a:t>
+            </a:r>
+          </a:p>
+          <a:p>
+            <a:pPr marL="742950" lvl="1" indent="-285750">
+              <a:buFont typeface="Arial" panose="020B0604020202020204" pitchFamily="34" charset="0"/>
+              <a:buChar char="•"/>
+            </a:pPr>
+            <a:r>
+              <a:rPr lang="es-AR" sz="1800" dirty="0">
+                <a:latin typeface="Georgia" panose="02040502050405020303" pitchFamily="18" charset="0"/>
+                <a:sym typeface="Wingdings" panose="05000000000000000000" pitchFamily="2" charset="2"/>
+              </a:rPr>
+              <a:t>CU Gestionar Plan  modificaciones incorporadas no han sido probadas formalmente </a:t>
+            </a:r>
+          </a:p>
+          <a:p>
+            <a:pPr marL="742950" lvl="1" indent="-285750">
+              <a:buFont typeface="Arial" panose="020B0604020202020204" pitchFamily="34" charset="0"/>
+              <a:buChar char="•"/>
+            </a:pPr>
+            <a:endParaRPr lang="es-AR" sz="1800" dirty="0">
+              <a:latin typeface="Georgia" panose="02040502050405020303" pitchFamily="18" charset="0"/>
+            </a:endParaRPr>
+          </a:p>
+          <a:p>
+            <a:pPr marL="285750" indent="-285750">
+              <a:buFont typeface="Arial" panose="020B0604020202020204" pitchFamily="34" charset="0"/>
+              <a:buChar char="•"/>
+            </a:pPr>
+            <a:r>
+              <a:rPr lang="es-AR" sz="1800" dirty="0">
+                <a:latin typeface="Georgia" panose="02040502050405020303" pitchFamily="18" charset="0"/>
+              </a:rPr>
+              <a:t>Se han realizado pruebas de integración para validar la correcta comunicación entre los componentes del sistema</a:t>
+            </a:r>
           </a:p>
         </p:txBody>
       </p:sp>
     </p:spTree>
     <p:extLst>
       <p:ext uri="{BB962C8B-B14F-4D97-AF65-F5344CB8AC3E}">
-        <p14:creationId xmlns:p14="http://schemas.microsoft.com/office/powerpoint/2010/main" val="787335396"/>
+        <p14:creationId xmlns:p14="http://schemas.microsoft.com/office/powerpoint/2010/main" val="632692211"/>
       </p:ext>
     </p:extLst>
   </p:cSld>
   <p:clrMapOvr>
     <a:masterClrMapping/>
   </p:clrMapOvr>
-  <p:timing>
-    <p:tnLst>
-      <p:par>
-        <p:cTn id="1" dur="indefinite" restart="never" nodeType="tmRoot"/>
-      </p:par>
-    </p:tnLst>
-  </p:timing>
 </p:sld>
 </file>
 
@@ -8638,6 +8256,185 @@
       </p:grpSpPr>
       <p:sp>
         <p:nvSpPr>
+          <p:cNvPr id="2" name="1 Título"/>
+          <p:cNvSpPr>
+            <a:spLocks noGrp="1"/>
+          </p:cNvSpPr>
+          <p:nvPr>
+            <p:ph type="title"/>
+          </p:nvPr>
+        </p:nvSpPr>
+        <p:spPr>
+          <a:xfrm>
+            <a:off x="1598611" y="85725"/>
+            <a:ext cx="10018713" cy="1752599"/>
+          </a:xfrm>
+        </p:spPr>
+        <p:txBody>
+          <a:bodyPr>
+            <a:normAutofit/>
+          </a:bodyPr>
+          <a:lstStyle/>
+          <a:p>
+            <a:r>
+              <a:rPr lang="es-AR" dirty="0">
+                <a:latin typeface="Georgia" panose="02040502050405020303" pitchFamily="18" charset="0"/>
+              </a:rPr>
+              <a:t>Estado del Sistema - Documentación</a:t>
+            </a:r>
+          </a:p>
+        </p:txBody>
+      </p:sp>
+      <p:sp>
+        <p:nvSpPr>
+          <p:cNvPr id="3" name="2 Marcador de contenido"/>
+          <p:cNvSpPr>
+            <a:spLocks noGrp="1"/>
+          </p:cNvSpPr>
+          <p:nvPr>
+            <p:ph idx="1"/>
+          </p:nvPr>
+        </p:nvSpPr>
+        <p:spPr>
+          <a:xfrm>
+            <a:off x="1484310" y="2409825"/>
+            <a:ext cx="10018713" cy="3381375"/>
+          </a:xfrm>
+        </p:spPr>
+        <p:txBody>
+          <a:bodyPr>
+            <a:normAutofit fontScale="85000" lnSpcReduction="20000"/>
+          </a:bodyPr>
+          <a:lstStyle/>
+          <a:p>
+            <a:r>
+              <a:rPr lang="es-AR" dirty="0">
+                <a:latin typeface="Georgia" panose="02040502050405020303" pitchFamily="18" charset="0"/>
+              </a:rPr>
+              <a:t>De un total de 28 documentos, se cuenta con: </a:t>
+            </a:r>
+          </a:p>
+          <a:p>
+            <a:r>
+              <a:rPr lang="es-AR" dirty="0">
+                <a:latin typeface="Georgia" panose="02040502050405020303" pitchFamily="18" charset="0"/>
+              </a:rPr>
+              <a:t>23 Finalizados</a:t>
+            </a:r>
+          </a:p>
+          <a:p>
+            <a:r>
+              <a:rPr lang="es-AR" dirty="0">
+                <a:latin typeface="Georgia" panose="02040502050405020303" pitchFamily="18" charset="0"/>
+              </a:rPr>
+              <a:t>4 Avanzados</a:t>
+            </a:r>
+          </a:p>
+          <a:p>
+            <a:pPr lvl="1"/>
+            <a:r>
+              <a:rPr lang="es-AR" dirty="0">
+                <a:latin typeface="Georgia" panose="02040502050405020303" pitchFamily="18" charset="0"/>
+              </a:rPr>
+              <a:t>Memoria del proyecto</a:t>
+            </a:r>
+          </a:p>
+          <a:p>
+            <a:pPr lvl="1"/>
+            <a:r>
+              <a:rPr lang="es-AR" dirty="0">
+                <a:latin typeface="Georgia" panose="02040502050405020303" pitchFamily="18" charset="0"/>
+              </a:rPr>
+              <a:t>Glosario</a:t>
+            </a:r>
+          </a:p>
+          <a:p>
+            <a:pPr lvl="1"/>
+            <a:r>
+              <a:rPr lang="es-AR" dirty="0">
+                <a:latin typeface="Georgia" panose="02040502050405020303" pitchFamily="18" charset="0"/>
+              </a:rPr>
+              <a:t>Manual de Usuario</a:t>
+            </a:r>
+          </a:p>
+          <a:p>
+            <a:pPr lvl="1"/>
+            <a:r>
+              <a:rPr lang="es-AR" dirty="0">
+                <a:latin typeface="Georgia" panose="02040502050405020303" pitchFamily="18" charset="0"/>
+              </a:rPr>
+              <a:t>Casos de Prueba</a:t>
+            </a:r>
+          </a:p>
+          <a:p>
+            <a:r>
+              <a:rPr lang="es-AR" dirty="0">
+                <a:latin typeface="Georgia" panose="02040502050405020303" pitchFamily="18" charset="0"/>
+              </a:rPr>
+              <a:t>1 Incompleto (todavía no se ha iniciado)</a:t>
+            </a:r>
+          </a:p>
+          <a:p>
+            <a:pPr lvl="1"/>
+            <a:r>
+              <a:rPr lang="es-AR" dirty="0">
+                <a:latin typeface="Georgia" panose="02040502050405020303" pitchFamily="18" charset="0"/>
+              </a:rPr>
+              <a:t>Manual de Instalación</a:t>
+            </a:r>
+          </a:p>
+        </p:txBody>
+      </p:sp>
+      <p:graphicFrame>
+        <p:nvGraphicFramePr>
+          <p:cNvPr id="5" name="3 Marcador de contenido"/>
+          <p:cNvGraphicFramePr>
+            <a:graphicFrameLocks/>
+          </p:cNvGraphicFramePr>
+          <p:nvPr/>
+        </p:nvGraphicFramePr>
+        <p:xfrm>
+          <a:off x="7555979" y="2666999"/>
+          <a:ext cx="4340746" cy="2927449"/>
+        </p:xfrm>
+        <a:graphic>
+          <a:graphicData uri="http://schemas.openxmlformats.org/drawingml/2006/chart">
+            <c:chart xmlns:c="http://schemas.openxmlformats.org/drawingml/2006/chart" xmlns:r="http://schemas.openxmlformats.org/officeDocument/2006/relationships" r:id="rId2"/>
+          </a:graphicData>
+        </a:graphic>
+      </p:graphicFrame>
+    </p:spTree>
+    <p:extLst>
+      <p:ext uri="{BB962C8B-B14F-4D97-AF65-F5344CB8AC3E}">
+        <p14:creationId xmlns:p14="http://schemas.microsoft.com/office/powerpoint/2010/main" val="1831805038"/>
+      </p:ext>
+    </p:extLst>
+  </p:cSld>
+  <p:clrMapOvr>
+    <a:masterClrMapping/>
+  </p:clrMapOvr>
+</p:sld>
+</file>
+
+<file path=ppt/slides/slide17.xml><?xml version="1.0" encoding="utf-8"?>
+<p:sld xmlns:a="http://schemas.openxmlformats.org/drawingml/2006/main" xmlns:r="http://schemas.openxmlformats.org/officeDocument/2006/relationships" xmlns:p="http://schemas.openxmlformats.org/presentationml/2006/main">
+  <p:cSld>
+    <p:spTree>
+      <p:nvGrpSpPr>
+        <p:cNvPr id="1" name=""/>
+        <p:cNvGrpSpPr/>
+        <p:nvPr/>
+      </p:nvGrpSpPr>
+      <p:grpSpPr>
+        <a:xfrm>
+          <a:off x="0" y="0"/>
+          <a:ext cx="0" cy="0"/>
+          <a:chOff x="0" y="0"/>
+          <a:chExt cx="0" cy="0"/>
+        </a:xfrm>
+      </p:grpSpPr>
+      <p:sp>
+        <p:nvSpPr>
           <p:cNvPr id="4" name="Rectángulo 3">
             <a:extLst>
               <a:ext uri="{FF2B5EF4-FFF2-40B4-BE49-F238E27FC236}">
@@ -8649,9 +8446,9 @@
           <p:nvPr/>
         </p:nvSpPr>
         <p:spPr>
-          <a:xfrm rot="20412167">
-            <a:off x="3988076" y="2403824"/>
-            <a:ext cx="6633581" cy="1107996"/>
+          <a:xfrm rot="21070331">
+            <a:off x="1502727" y="2109480"/>
+            <a:ext cx="9934413" cy="2123658"/>
           </a:xfrm>
           <a:prstGeom prst="rect">
             <a:avLst/>
@@ -8679,10 +8476,13 @@
                   </a:outerShdw>
                 </a:effectLst>
               </a:rPr>
-              <a:t>¡</a:t>
-            </a:r>
-            <a:r>
-              <a:rPr lang="es-ES" sz="6600" b="1" cap="none" spc="0" dirty="0">
+              <a:t>CU Generar </a:t>
+            </a:r>
+          </a:p>
+          <a:p>
+            <a:pPr algn="ctr"/>
+            <a:r>
+              <a:rPr lang="es-ES" sz="6600" b="1" dirty="0">
                 <a:ln w="0"/>
                 <a:solidFill>
                   <a:schemeClr val="accent1"/>
@@ -8695,27 +8495,104 @@
                   </a:outerShdw>
                 </a:effectLst>
               </a:rPr>
-              <a:t>Muchas gracias!</a:t>
-            </a:r>
-          </a:p>
-        </p:txBody>
-      </p:sp>
-      <p:sp>
-        <p:nvSpPr>
-          <p:cNvPr id="2" name="CuadroTexto 1">
+              <a:t>Informe Gerencial</a:t>
+            </a:r>
+          </a:p>
+        </p:txBody>
+      </p:sp>
+      <p:sp>
+        <p:nvSpPr>
+          <p:cNvPr id="2" name="Botón de acción: ir hacia delante o siguiente 1">
+            <a:hlinkClick r:id="rId2" action="ppaction://hlinkfile" highlightClick="1"/>
             <a:extLst>
               <a:ext uri="{FF2B5EF4-FFF2-40B4-BE49-F238E27FC236}">
-                <a16:creationId xmlns:a16="http://schemas.microsoft.com/office/drawing/2014/main" id="{BBF285E2-50A8-4654-BD24-220C20D7C57B}"/>
+                <a16:creationId xmlns:a16="http://schemas.microsoft.com/office/drawing/2014/main" id="{D7F4B3B7-EF34-4E55-9BA0-C07267366F2E}"/>
               </a:ext>
             </a:extLst>
           </p:cNvPr>
-          <p:cNvSpPr txBox="1"/>
+          <p:cNvSpPr/>
           <p:nvPr/>
         </p:nvSpPr>
         <p:spPr>
           <a:xfrm>
-            <a:off x="7202660" y="5767753"/>
-            <a:ext cx="4740812" cy="400110"/>
+            <a:off x="10506635" y="5764306"/>
+            <a:ext cx="851647" cy="735106"/>
+          </a:xfrm>
+          <a:prstGeom prst="actionButtonForwardNext">
+            <a:avLst/>
+          </a:prstGeom>
+        </p:spPr>
+        <p:style>
+          <a:lnRef idx="2">
+            <a:schemeClr val="accent1">
+              <a:shade val="50000"/>
+            </a:schemeClr>
+          </a:lnRef>
+          <a:fillRef idx="1">
+            <a:schemeClr val="accent1"/>
+          </a:fillRef>
+          <a:effectRef idx="0">
+            <a:schemeClr val="accent1"/>
+          </a:effectRef>
+          <a:fontRef idx="minor">
+            <a:schemeClr val="lt1"/>
+          </a:fontRef>
+        </p:style>
+        <p:txBody>
+          <a:bodyPr rtlCol="0" anchor="ctr"/>
+          <a:lstStyle/>
+          <a:p>
+            <a:pPr algn="ctr"/>
+            <a:endParaRPr lang="es-AR"/>
+          </a:p>
+        </p:txBody>
+      </p:sp>
+    </p:spTree>
+    <p:extLst>
+      <p:ext uri="{BB962C8B-B14F-4D97-AF65-F5344CB8AC3E}">
+        <p14:creationId xmlns:p14="http://schemas.microsoft.com/office/powerpoint/2010/main" val="891526607"/>
+      </p:ext>
+    </p:extLst>
+  </p:cSld>
+  <p:clrMapOvr>
+    <a:masterClrMapping/>
+  </p:clrMapOvr>
+</p:sld>
+</file>
+
+<file path=ppt/slides/slide18.xml><?xml version="1.0" encoding="utf-8"?>
+<p:sld xmlns:a="http://schemas.openxmlformats.org/drawingml/2006/main" xmlns:r="http://schemas.openxmlformats.org/officeDocument/2006/relationships" xmlns:p="http://schemas.openxmlformats.org/presentationml/2006/main">
+  <p:cSld>
+    <p:spTree>
+      <p:nvGrpSpPr>
+        <p:cNvPr id="1" name=""/>
+        <p:cNvGrpSpPr/>
+        <p:nvPr/>
+      </p:nvGrpSpPr>
+      <p:grpSpPr>
+        <a:xfrm>
+          <a:off x="0" y="0"/>
+          <a:ext cx="0" cy="0"/>
+          <a:chOff x="0" y="0"/>
+          <a:chExt cx="0" cy="0"/>
+        </a:xfrm>
+      </p:grpSpPr>
+      <p:sp>
+        <p:nvSpPr>
+          <p:cNvPr id="4" name="Rectángulo 3">
+            <a:extLst>
+              <a:ext uri="{FF2B5EF4-FFF2-40B4-BE49-F238E27FC236}">
+                <a16:creationId xmlns:a16="http://schemas.microsoft.com/office/drawing/2014/main" id="{B0F1B4F4-0C7A-4C0E-8584-95718BC545EC}"/>
+              </a:ext>
+            </a:extLst>
+          </p:cNvPr>
+          <p:cNvSpPr/>
+          <p:nvPr/>
+        </p:nvSpPr>
+        <p:spPr>
+          <a:xfrm rot="21070331">
+            <a:off x="1502727" y="2617311"/>
+            <a:ext cx="9934413" cy="1107996"/>
           </a:xfrm>
           <a:prstGeom prst="rect">
             <a:avLst/>
@@ -8723,14 +8600,27 @@
           <a:noFill/>
         </p:spPr>
         <p:txBody>
-          <a:bodyPr wrap="square" rtlCol="0">
+          <a:bodyPr wrap="square" lIns="91440" tIns="45720" rIns="91440" bIns="45720">
             <a:spAutoFit/>
           </a:bodyPr>
           <a:lstStyle/>
           <a:p>
-            <a:r>
-              <a:rPr lang="es-AR" sz="2000" b="1" dirty="0"/>
-              <a:t>https://github.com/fge23/Sistema-VASPA</a:t>
+            <a:pPr algn="ctr"/>
+            <a:r>
+              <a:rPr lang="es-ES" sz="6600" b="1" dirty="0">
+                <a:ln w="0"/>
+                <a:solidFill>
+                  <a:schemeClr val="accent1"/>
+                </a:solidFill>
+                <a:effectLst>
+                  <a:outerShdw blurRad="38100" dist="25400" dir="5400000" algn="ctr" rotWithShape="0">
+                    <a:srgbClr val="6E747A">
+                      <a:alpha val="43000"/>
+                    </a:srgbClr>
+                  </a:outerShdw>
+                </a:effectLst>
+              </a:rPr>
+              <a:t>Aplicación Móvil</a:t>
             </a:r>
           </a:p>
         </p:txBody>
@@ -8738,20 +8628,162 @@
     </p:spTree>
     <p:extLst>
       <p:ext uri="{BB962C8B-B14F-4D97-AF65-F5344CB8AC3E}">
-        <p14:creationId xmlns:p14="http://schemas.microsoft.com/office/powerpoint/2010/main" val="3442063561"/>
+        <p14:creationId xmlns:p14="http://schemas.microsoft.com/office/powerpoint/2010/main" val="4079963416"/>
       </p:ext>
     </p:extLst>
   </p:cSld>
   <p:clrMapOvr>
     <a:masterClrMapping/>
   </p:clrMapOvr>
-  <p:timing>
-    <p:tnLst>
-      <p:par>
-        <p:cTn id="1" dur="indefinite" restart="never" nodeType="tmRoot"/>
-      </p:par>
-    </p:tnLst>
-  </p:timing>
+</p:sld>
+</file>
+
+<file path=ppt/slides/slide19.xml><?xml version="1.0" encoding="utf-8"?>
+<p:sld xmlns:a="http://schemas.openxmlformats.org/drawingml/2006/main" xmlns:r="http://schemas.openxmlformats.org/officeDocument/2006/relationships" xmlns:p="http://schemas.openxmlformats.org/presentationml/2006/main">
+  <p:cSld>
+    <p:spTree>
+      <p:nvGrpSpPr>
+        <p:cNvPr id="1" name=""/>
+        <p:cNvGrpSpPr/>
+        <p:nvPr/>
+      </p:nvGrpSpPr>
+      <p:grpSpPr>
+        <a:xfrm>
+          <a:off x="0" y="0"/>
+          <a:ext cx="0" cy="0"/>
+          <a:chOff x="0" y="0"/>
+          <a:chExt cx="0" cy="0"/>
+        </a:xfrm>
+      </p:grpSpPr>
+      <p:sp>
+        <p:nvSpPr>
+          <p:cNvPr id="2" name="Título 1">
+            <a:extLst>
+              <a:ext uri="{FF2B5EF4-FFF2-40B4-BE49-F238E27FC236}">
+                <a16:creationId xmlns:a16="http://schemas.microsoft.com/office/drawing/2014/main" id="{0ED6D180-92C1-4333-BA91-2BBA4DD94A3B}"/>
+              </a:ext>
+            </a:extLst>
+          </p:cNvPr>
+          <p:cNvSpPr>
+            <a:spLocks noGrp="1"/>
+          </p:cNvSpPr>
+          <p:nvPr>
+            <p:ph type="title"/>
+          </p:nvPr>
+        </p:nvSpPr>
+        <p:spPr>
+          <a:xfrm>
+            <a:off x="1367768" y="-171396"/>
+            <a:ext cx="10922000" cy="1752599"/>
+          </a:xfrm>
+        </p:spPr>
+        <p:txBody>
+          <a:bodyPr>
+            <a:normAutofit/>
+          </a:bodyPr>
+          <a:lstStyle/>
+          <a:p>
+            <a:r>
+              <a:rPr lang="es-ES" sz="3600" dirty="0">
+                <a:latin typeface="Georgia" panose="02040502050405020303" pitchFamily="18" charset="0"/>
+              </a:rPr>
+              <a:t>Aplicación Móvil | Arquitectura - Implementación</a:t>
+            </a:r>
+          </a:p>
+        </p:txBody>
+      </p:sp>
+      <p:pic>
+        <p:nvPicPr>
+          <p:cNvPr id="13" name="Imagen 12">
+            <a:extLst>
+              <a:ext uri="{FF2B5EF4-FFF2-40B4-BE49-F238E27FC236}">
+                <a16:creationId xmlns:a16="http://schemas.microsoft.com/office/drawing/2014/main" id="{FCC26050-5F59-41A3-BF4B-7F8AD9F429BD}"/>
+              </a:ext>
+            </a:extLst>
+          </p:cNvPr>
+          <p:cNvPicPr>
+            <a:picLocks noChangeAspect="1"/>
+          </p:cNvPicPr>
+          <p:nvPr/>
+        </p:nvPicPr>
+        <p:blipFill>
+          <a:blip r:embed="rId2">
+            <a:extLst>
+              <a:ext uri="{28A0092B-C50C-407E-A947-70E740481C1C}">
+                <a14:useLocalDpi xmlns:a14="http://schemas.microsoft.com/office/drawing/2010/main" val="0"/>
+              </a:ext>
+            </a:extLst>
+          </a:blip>
+          <a:srcRect/>
+          <a:stretch/>
+        </p:blipFill>
+        <p:spPr>
+          <a:xfrm>
+            <a:off x="1796378" y="1581202"/>
+            <a:ext cx="10190187" cy="4316676"/>
+          </a:xfrm>
+          <a:prstGeom prst="rect">
+            <a:avLst/>
+          </a:prstGeom>
+        </p:spPr>
+      </p:pic>
+      <p:sp>
+        <p:nvSpPr>
+          <p:cNvPr id="4" name="Botón de acción: ir hacia delante o siguiente 3">
+            <a:hlinkClick r:id="rId3" action="ppaction://hlinkfile" highlightClick="1"/>
+            <a:extLst>
+              <a:ext uri="{FF2B5EF4-FFF2-40B4-BE49-F238E27FC236}">
+                <a16:creationId xmlns:a16="http://schemas.microsoft.com/office/drawing/2014/main" id="{426A10E7-4179-45F9-B887-C13E2B7C09DF}"/>
+              </a:ext>
+            </a:extLst>
+          </p:cNvPr>
+          <p:cNvSpPr/>
+          <p:nvPr/>
+        </p:nvSpPr>
+        <p:spPr>
+          <a:xfrm>
+            <a:off x="11187953" y="6293224"/>
+            <a:ext cx="663388" cy="403411"/>
+          </a:xfrm>
+          <a:prstGeom prst="actionButtonForwardNext">
+            <a:avLst/>
+          </a:prstGeom>
+        </p:spPr>
+        <p:style>
+          <a:lnRef idx="2">
+            <a:schemeClr val="accent1">
+              <a:shade val="50000"/>
+            </a:schemeClr>
+          </a:lnRef>
+          <a:fillRef idx="1">
+            <a:schemeClr val="accent1"/>
+          </a:fillRef>
+          <a:effectRef idx="0">
+            <a:schemeClr val="accent1"/>
+          </a:effectRef>
+          <a:fontRef idx="minor">
+            <a:schemeClr val="lt1"/>
+          </a:fontRef>
+        </p:style>
+        <p:txBody>
+          <a:bodyPr rtlCol="0" anchor="ctr"/>
+          <a:lstStyle/>
+          <a:p>
+            <a:pPr algn="ctr"/>
+            <a:endParaRPr lang="es-AR"/>
+          </a:p>
+        </p:txBody>
+      </p:sp>
+    </p:spTree>
+    <p:extLst>
+      <p:ext uri="{BB962C8B-B14F-4D97-AF65-F5344CB8AC3E}">
+        <p14:creationId xmlns:p14="http://schemas.microsoft.com/office/powerpoint/2010/main" val="1974247302"/>
+      </p:ext>
+    </p:extLst>
+  </p:cSld>
+  <p:clrMapOvr>
+    <a:masterClrMapping/>
+  </p:clrMapOvr>
 </p:sld>
 </file>
 
@@ -8919,13 +8951,135 @@
   <p:clrMapOvr>
     <a:masterClrMapping/>
   </p:clrMapOvr>
-  <p:timing>
-    <p:tnLst>
-      <p:par>
-        <p:cTn id="1" dur="indefinite" restart="never" nodeType="tmRoot"/>
-      </p:par>
-    </p:tnLst>
-  </p:timing>
+</p:sld>
+</file>
+
+<file path=ppt/slides/slide20.xml><?xml version="1.0" encoding="utf-8"?>
+<p:sld xmlns:a="http://schemas.openxmlformats.org/drawingml/2006/main" xmlns:r="http://schemas.openxmlformats.org/officeDocument/2006/relationships" xmlns:p="http://schemas.openxmlformats.org/presentationml/2006/main">
+  <p:cSld>
+    <p:spTree>
+      <p:nvGrpSpPr>
+        <p:cNvPr id="1" name=""/>
+        <p:cNvGrpSpPr/>
+        <p:nvPr/>
+      </p:nvGrpSpPr>
+      <p:grpSpPr>
+        <a:xfrm>
+          <a:off x="0" y="0"/>
+          <a:ext cx="0" cy="0"/>
+          <a:chOff x="0" y="0"/>
+          <a:chExt cx="0" cy="0"/>
+        </a:xfrm>
+      </p:grpSpPr>
+      <p:sp>
+        <p:nvSpPr>
+          <p:cNvPr id="4" name="Rectángulo 3">
+            <a:extLst>
+              <a:ext uri="{FF2B5EF4-FFF2-40B4-BE49-F238E27FC236}">
+                <a16:creationId xmlns:a16="http://schemas.microsoft.com/office/drawing/2014/main" id="{B0F1B4F4-0C7A-4C0E-8584-95718BC545EC}"/>
+              </a:ext>
+            </a:extLst>
+          </p:cNvPr>
+          <p:cNvSpPr/>
+          <p:nvPr/>
+        </p:nvSpPr>
+        <p:spPr>
+          <a:xfrm rot="20412167">
+            <a:off x="3988076" y="2403824"/>
+            <a:ext cx="6633581" cy="1107996"/>
+          </a:xfrm>
+          <a:prstGeom prst="rect">
+            <a:avLst/>
+          </a:prstGeom>
+          <a:noFill/>
+        </p:spPr>
+        <p:txBody>
+          <a:bodyPr wrap="square" lIns="91440" tIns="45720" rIns="91440" bIns="45720">
+            <a:spAutoFit/>
+          </a:bodyPr>
+          <a:lstStyle/>
+          <a:p>
+            <a:pPr algn="ctr"/>
+            <a:r>
+              <a:rPr lang="es-ES" sz="6600" b="1" dirty="0">
+                <a:ln w="0"/>
+                <a:solidFill>
+                  <a:schemeClr val="accent1"/>
+                </a:solidFill>
+                <a:effectLst>
+                  <a:outerShdw blurRad="38100" dist="25400" dir="5400000" algn="ctr" rotWithShape="0">
+                    <a:srgbClr val="6E747A">
+                      <a:alpha val="43000"/>
+                    </a:srgbClr>
+                  </a:outerShdw>
+                </a:effectLst>
+              </a:rPr>
+              <a:t>¡</a:t>
+            </a:r>
+            <a:r>
+              <a:rPr lang="es-ES" sz="6600" b="1" cap="none" spc="0" dirty="0">
+                <a:ln w="0"/>
+                <a:solidFill>
+                  <a:schemeClr val="accent1"/>
+                </a:solidFill>
+                <a:effectLst>
+                  <a:outerShdw blurRad="38100" dist="25400" dir="5400000" algn="ctr" rotWithShape="0">
+                    <a:srgbClr val="6E747A">
+                      <a:alpha val="43000"/>
+                    </a:srgbClr>
+                  </a:outerShdw>
+                </a:effectLst>
+              </a:rPr>
+              <a:t>Muchas gracias!</a:t>
+            </a:r>
+          </a:p>
+        </p:txBody>
+      </p:sp>
+      <p:sp>
+        <p:nvSpPr>
+          <p:cNvPr id="2" name="CuadroTexto 1">
+            <a:extLst>
+              <a:ext uri="{FF2B5EF4-FFF2-40B4-BE49-F238E27FC236}">
+                <a16:creationId xmlns:a16="http://schemas.microsoft.com/office/drawing/2014/main" id="{BBF285E2-50A8-4654-BD24-220C20D7C57B}"/>
+              </a:ext>
+            </a:extLst>
+          </p:cNvPr>
+          <p:cNvSpPr txBox="1"/>
+          <p:nvPr/>
+        </p:nvSpPr>
+        <p:spPr>
+          <a:xfrm>
+            <a:off x="7202660" y="5767753"/>
+            <a:ext cx="4740812" cy="400110"/>
+          </a:xfrm>
+          <a:prstGeom prst="rect">
+            <a:avLst/>
+          </a:prstGeom>
+          <a:noFill/>
+        </p:spPr>
+        <p:txBody>
+          <a:bodyPr wrap="square" rtlCol="0">
+            <a:spAutoFit/>
+          </a:bodyPr>
+          <a:lstStyle/>
+          <a:p>
+            <a:r>
+              <a:rPr lang="es-AR" sz="2000" b="1" dirty="0"/>
+              <a:t>https://github.com/fge23/Sistema-VASPA</a:t>
+            </a:r>
+          </a:p>
+        </p:txBody>
+      </p:sp>
+    </p:spTree>
+    <p:extLst>
+      <p:ext uri="{BB962C8B-B14F-4D97-AF65-F5344CB8AC3E}">
+        <p14:creationId xmlns:p14="http://schemas.microsoft.com/office/powerpoint/2010/main" val="3442063561"/>
+      </p:ext>
+    </p:extLst>
+  </p:cSld>
+  <p:clrMapOvr>
+    <a:masterClrMapping/>
+  </p:clrMapOvr>
 </p:sld>
 </file>
 
@@ -8979,7 +9133,7 @@
               <a:rPr lang="es-AR" sz="5400" dirty="0">
                 <a:latin typeface="Georgia" panose="02040502050405020303" pitchFamily="18" charset="0"/>
               </a:rPr>
-              <a:t>Temario I - Presentación</a:t>
+              <a:t>Temario</a:t>
             </a:r>
           </a:p>
         </p:txBody>
@@ -9002,7 +9156,7 @@
         </p:nvSpPr>
         <p:spPr>
           <a:xfrm>
-            <a:off x="4525816" y="1954570"/>
+            <a:off x="3594571" y="1999394"/>
             <a:ext cx="8028303" cy="4255162"/>
           </a:xfrm>
         </p:spPr>
@@ -9016,7 +9170,102 @@
               <a:buFont typeface="Arial" panose="020B0604020202020204" pitchFamily="34" charset="0"/>
               <a:buChar char="•"/>
             </a:pPr>
-            <a:endParaRPr lang="es-AR" sz="2400" dirty="0"/>
+            <a:r>
+              <a:rPr lang="es-ES" sz="2400" dirty="0">
+                <a:latin typeface="Georgia" panose="02040502050405020303" pitchFamily="18" charset="0"/>
+              </a:rPr>
+              <a:t>Resumen de últimos encuentros y avances</a:t>
+            </a:r>
+          </a:p>
+          <a:p>
+            <a:pPr marL="342900" indent="-342900" algn="l">
+              <a:buFont typeface="Arial" panose="020B0604020202020204" pitchFamily="34" charset="0"/>
+              <a:buChar char="•"/>
+            </a:pPr>
+            <a:r>
+              <a:rPr lang="es-ES" sz="2400" dirty="0">
+                <a:latin typeface="Georgia" panose="02040502050405020303" pitchFamily="18" charset="0"/>
+              </a:rPr>
+              <a:t>Casos de Uso del Sistema</a:t>
+            </a:r>
+          </a:p>
+          <a:p>
+            <a:pPr marL="342900" indent="-342900" algn="l">
+              <a:buFont typeface="Arial" panose="020B0604020202020204" pitchFamily="34" charset="0"/>
+              <a:buChar char="•"/>
+            </a:pPr>
+            <a:r>
+              <a:rPr lang="es-ES" sz="2400" dirty="0">
+                <a:latin typeface="Georgia" panose="02040502050405020303" pitchFamily="18" charset="0"/>
+              </a:rPr>
+              <a:t>Estado del Proyecto</a:t>
+            </a:r>
+          </a:p>
+          <a:p>
+            <a:pPr algn="l"/>
+            <a:endParaRPr lang="es-ES" sz="2300" dirty="0">
+              <a:latin typeface="Georgia" panose="02040502050405020303" pitchFamily="18" charset="0"/>
+            </a:endParaRPr>
+          </a:p>
+          <a:p>
+            <a:pPr marL="342900" indent="-342900" algn="l">
+              <a:buFont typeface="Arial" panose="020B0604020202020204" pitchFamily="34" charset="0"/>
+              <a:buChar char="•"/>
+            </a:pPr>
+            <a:r>
+              <a:rPr lang="es-ES" sz="2400" dirty="0">
+                <a:latin typeface="Georgia" panose="02040502050405020303" pitchFamily="18" charset="0"/>
+              </a:rPr>
+              <a:t>Presentación de CU Informe Gerencial</a:t>
+            </a:r>
+          </a:p>
+          <a:p>
+            <a:pPr marL="342900" indent="-342900" algn="l">
+              <a:buFont typeface="Arial" panose="020B0604020202020204" pitchFamily="34" charset="0"/>
+              <a:buChar char="•"/>
+            </a:pPr>
+            <a:r>
+              <a:rPr lang="es-ES" sz="2400" dirty="0">
+                <a:latin typeface="Georgia" panose="02040502050405020303" pitchFamily="18" charset="0"/>
+              </a:rPr>
+              <a:t>Presentación de Aplicación Móvil</a:t>
+            </a:r>
+          </a:p>
+          <a:p>
+            <a:pPr marL="342900" indent="-342900" algn="l">
+              <a:buFont typeface="Arial" panose="020B0604020202020204" pitchFamily="34" charset="0"/>
+              <a:buChar char="•"/>
+            </a:pPr>
+            <a:endParaRPr lang="es-ES" sz="2400" dirty="0">
+              <a:latin typeface="Georgia" panose="02040502050405020303" pitchFamily="18" charset="0"/>
+            </a:endParaRPr>
+          </a:p>
+          <a:p>
+            <a:pPr marL="342900" indent="-342900" algn="l">
+              <a:buFont typeface="Arial" panose="020B0604020202020204" pitchFamily="34" charset="0"/>
+              <a:buChar char="•"/>
+            </a:pPr>
+            <a:endParaRPr lang="es-ES" sz="2400" dirty="0">
+              <a:latin typeface="Georgia" panose="02040502050405020303" pitchFamily="18" charset="0"/>
+            </a:endParaRPr>
+          </a:p>
+          <a:p>
+            <a:pPr marL="342900" indent="-342900" algn="l">
+              <a:buFont typeface="Arial" panose="020B0604020202020204" pitchFamily="34" charset="0"/>
+              <a:buChar char="•"/>
+            </a:pPr>
+            <a:endParaRPr lang="es-ES" sz="2400" dirty="0">
+              <a:latin typeface="Georgia" panose="02040502050405020303" pitchFamily="18" charset="0"/>
+            </a:endParaRPr>
+          </a:p>
+          <a:p>
+            <a:pPr marL="342900" indent="-342900" algn="l">
+              <a:buFont typeface="Arial" panose="020B0604020202020204" pitchFamily="34" charset="0"/>
+              <a:buChar char="•"/>
+            </a:pPr>
+            <a:endParaRPr lang="es-AR" sz="2400" dirty="0">
+              <a:latin typeface="Georgia" panose="02040502050405020303" pitchFamily="18" charset="0"/>
+            </a:endParaRPr>
           </a:p>
         </p:txBody>
       </p:sp>
@@ -9030,13 +9279,6 @@
   <p:clrMapOvr>
     <a:masterClrMapping/>
   </p:clrMapOvr>
-  <p:timing>
-    <p:tnLst>
-      <p:par>
-        <p:cTn id="1" dur="indefinite" restart="never" nodeType="tmRoot"/>
-      </p:par>
-    </p:tnLst>
-  </p:timing>
 </p:sld>
 </file>
 
@@ -9059,10 +9301,10 @@
       </p:grpSpPr>
       <p:sp>
         <p:nvSpPr>
-          <p:cNvPr id="4" name="Título 3">
+          <p:cNvPr id="2" name="Título 1">
             <a:extLst>
               <a:ext uri="{FF2B5EF4-FFF2-40B4-BE49-F238E27FC236}">
-                <a16:creationId xmlns:a16="http://schemas.microsoft.com/office/drawing/2014/main" id="{FA4EADB5-92CE-4B25-BE21-7FC484AE680E}"/>
+                <a16:creationId xmlns:a16="http://schemas.microsoft.com/office/drawing/2014/main" id="{0ED6D180-92C1-4333-BA91-2BBA4DD94A3B}"/>
               </a:ext>
             </a:extLst>
           </p:cNvPr>
@@ -9070,48 +9312,13 @@
             <a:spLocks noGrp="1"/>
           </p:cNvSpPr>
           <p:nvPr>
-            <p:ph type="ctrTitle"/>
+            <p:ph type="title"/>
           </p:nvPr>
         </p:nvSpPr>
         <p:spPr>
           <a:xfrm>
-            <a:off x="2335237" y="477485"/>
-            <a:ext cx="8892471" cy="1240040"/>
-          </a:xfrm>
-        </p:spPr>
-        <p:txBody>
-          <a:bodyPr>
-            <a:normAutofit fontScale="90000"/>
-          </a:bodyPr>
-          <a:lstStyle/>
-          <a:p>
-            <a:r>
-              <a:rPr lang="es-AR" dirty="0"/>
-              <a:t>Temario II – Implementación</a:t>
-            </a:r>
-          </a:p>
-        </p:txBody>
-      </p:sp>
-      <p:sp>
-        <p:nvSpPr>
-          <p:cNvPr id="5" name="Subtítulo 4">
-            <a:extLst>
-              <a:ext uri="{FF2B5EF4-FFF2-40B4-BE49-F238E27FC236}">
-                <a16:creationId xmlns:a16="http://schemas.microsoft.com/office/drawing/2014/main" id="{7035CB29-6D24-4E02-AC9F-07DC0DE9312C}"/>
-              </a:ext>
-            </a:extLst>
-          </p:cNvPr>
-          <p:cNvSpPr>
-            <a:spLocks noGrp="1"/>
-          </p:cNvSpPr>
-          <p:nvPr>
-            <p:ph type="subTitle" idx="1"/>
-          </p:nvPr>
-        </p:nvSpPr>
-        <p:spPr>
-          <a:xfrm>
-            <a:off x="3349802" y="2018345"/>
-            <a:ext cx="8028303" cy="4255162"/>
+            <a:off x="1270000" y="61686"/>
+            <a:ext cx="10574997" cy="1752599"/>
           </a:xfrm>
         </p:spPr>
         <p:txBody>
@@ -9120,491 +9327,165 @@
           </a:bodyPr>
           <a:lstStyle/>
           <a:p>
-            <a:pPr marL="342900" indent="-342900" algn="l">
-              <a:buFont typeface="Arial" panose="020B0604020202020204" pitchFamily="34" charset="0"/>
-              <a:buChar char="•"/>
-            </a:pPr>
-            <a:r>
-              <a:rPr lang="es-AR" sz="2400" dirty="0"/>
-              <a:t>Implementación de </a:t>
-            </a:r>
-            <a:r>
-              <a:rPr lang="es-AR" sz="2400" dirty="0" smtClean="0"/>
-              <a:t>X Casos </a:t>
-            </a:r>
-            <a:r>
-              <a:rPr lang="es-AR" sz="2400" dirty="0"/>
-              <a:t>de Uso:</a:t>
-            </a:r>
-          </a:p>
-          <a:p>
-            <a:pPr marL="342900" indent="-342900" algn="l">
-              <a:buFont typeface="Arial" panose="020B0604020202020204" pitchFamily="34" charset="0"/>
-              <a:buChar char="•"/>
-            </a:pPr>
-            <a:r>
-              <a:rPr lang="es-AR" sz="2400" dirty="0"/>
-              <a:t>Sistema Web:</a:t>
-            </a:r>
-          </a:p>
-          <a:p>
-            <a:pPr marL="800100" lvl="1" indent="-342900" algn="l">
-              <a:buFont typeface="Arial" panose="020B0604020202020204" pitchFamily="34" charset="0"/>
-              <a:buChar char="•"/>
-            </a:pPr>
-            <a:r>
-              <a:rPr lang="es-AR" sz="2200" dirty="0" smtClean="0"/>
-              <a:t>X </a:t>
-            </a:r>
-            <a:r>
-              <a:rPr lang="es-AR" sz="2200" dirty="0"/>
-              <a:t>Casos de Uso principales</a:t>
-            </a:r>
-          </a:p>
-          <a:p>
-            <a:pPr lvl="1" algn="l"/>
-            <a:endParaRPr lang="es-AR" sz="2200" dirty="0" smtClean="0"/>
-          </a:p>
-          <a:p>
-            <a:pPr lvl="1" algn="l"/>
-            <a:endParaRPr lang="es-AR" sz="2200" dirty="0"/>
-          </a:p>
-          <a:p>
-            <a:pPr marL="342900" indent="-342900" algn="l">
-              <a:buFont typeface="Arial" panose="020B0604020202020204" pitchFamily="34" charset="0"/>
-              <a:buChar char="•"/>
-            </a:pPr>
-            <a:r>
-              <a:rPr lang="es-AR" sz="2400" dirty="0"/>
-              <a:t>Aplicación móvil </a:t>
-            </a:r>
-          </a:p>
-          <a:p>
-            <a:pPr marL="800100" lvl="1" indent="-342900" algn="l">
-              <a:buFont typeface="Arial" panose="020B0604020202020204" pitchFamily="34" charset="0"/>
-              <a:buChar char="•"/>
-            </a:pPr>
-            <a:r>
-              <a:rPr lang="es-AR" sz="2300" dirty="0" smtClean="0"/>
-              <a:t>Búsqueda y Visualización </a:t>
-            </a:r>
-            <a:r>
-              <a:rPr lang="es-AR" sz="2300" dirty="0"/>
-              <a:t>de </a:t>
-            </a:r>
-            <a:r>
-              <a:rPr lang="es-AR" sz="2300" dirty="0" smtClean="0"/>
-              <a:t>Programa en PDF</a:t>
-            </a:r>
-            <a:endParaRPr lang="es-AR" sz="2300" dirty="0"/>
-          </a:p>
-          <a:p>
-            <a:pPr marL="342900" indent="-342900" algn="l">
-              <a:buFont typeface="Arial" panose="020B0604020202020204" pitchFamily="34" charset="0"/>
-              <a:buChar char="•"/>
-            </a:pPr>
-            <a:endParaRPr lang="es-AR" dirty="0"/>
-          </a:p>
-        </p:txBody>
-      </p:sp>
-      <p:pic>
-        <p:nvPicPr>
-          <p:cNvPr id="6" name="Imagen 5">
+            <a:r>
+              <a:rPr lang="es-AR" sz="4000" dirty="0">
+                <a:latin typeface="Georgia" panose="02040502050405020303" pitchFamily="18" charset="0"/>
+              </a:rPr>
+              <a:t>Resumen de la última presentación</a:t>
+            </a:r>
+          </a:p>
+        </p:txBody>
+      </p:sp>
+      <p:sp>
+        <p:nvSpPr>
+          <p:cNvPr id="6" name="Marcador de contenido 5">
             <a:extLst>
               <a:ext uri="{FF2B5EF4-FFF2-40B4-BE49-F238E27FC236}">
-                <a16:creationId xmlns:a16="http://schemas.microsoft.com/office/drawing/2014/main" id="{D3E3C482-901A-431D-8EBF-659D1398387A}"/>
+                <a16:creationId xmlns:a16="http://schemas.microsoft.com/office/drawing/2014/main" id="{EF5FF892-247B-4782-9E12-A9439F8D5681}"/>
               </a:ext>
             </a:extLst>
           </p:cNvPr>
-          <p:cNvPicPr>
-            <a:picLocks noChangeAspect="1"/>
-          </p:cNvPicPr>
-          <p:nvPr/>
-        </p:nvPicPr>
-        <p:blipFill>
-          <a:blip r:embed="rId2" cstate="print">
-            <a:extLst>
-              <a:ext uri="{28A0092B-C50C-407E-A947-70E740481C1C}">
-                <a14:useLocalDpi xmlns:a14="http://schemas.microsoft.com/office/drawing/2010/main" val="0"/>
-              </a:ext>
-            </a:extLst>
-          </a:blip>
-          <a:stretch>
-            <a:fillRect/>
-          </a:stretch>
-        </p:blipFill>
+          <p:cNvSpPr>
+            <a:spLocks noGrp="1"/>
+          </p:cNvSpPr>
+          <p:nvPr>
+            <p:ph idx="1"/>
+          </p:nvPr>
+        </p:nvSpPr>
         <p:spPr>
           <a:xfrm>
-            <a:off x="7552314" y="5491030"/>
-            <a:ext cx="1726720" cy="1079200"/>
+            <a:off x="1484310" y="1872344"/>
+            <a:ext cx="10018713" cy="4812541"/>
           </a:xfrm>
-          <a:prstGeom prst="rect">
-            <a:avLst/>
-          </a:prstGeom>
         </p:spPr>
-      </p:pic>
-      <p:pic>
-        <p:nvPicPr>
-          <p:cNvPr id="8" name="Imagen 7">
-            <a:extLst>
-              <a:ext uri="{FF2B5EF4-FFF2-40B4-BE49-F238E27FC236}">
-                <a16:creationId xmlns:a16="http://schemas.microsoft.com/office/drawing/2014/main" id="{F7FE4061-0AB6-4263-BAF9-1E3F442EB436}"/>
-              </a:ext>
-            </a:extLst>
-          </p:cNvPr>
-          <p:cNvPicPr>
-            <a:picLocks noChangeAspect="1"/>
-          </p:cNvPicPr>
-          <p:nvPr/>
-        </p:nvPicPr>
-        <p:blipFill>
-          <a:blip r:embed="rId3" cstate="hqprint">
-            <a:extLst>
-              <a:ext uri="{28A0092B-C50C-407E-A947-70E740481C1C}">
-                <a14:useLocalDpi xmlns:a14="http://schemas.microsoft.com/office/drawing/2010/main" val="0"/>
-              </a:ext>
-            </a:extLst>
-          </a:blip>
-          <a:stretch>
-            <a:fillRect/>
-          </a:stretch>
-        </p:blipFill>
-        <p:spPr>
-          <a:xfrm>
-            <a:off x="5441608" y="5701597"/>
-            <a:ext cx="1726720" cy="603880"/>
-          </a:xfrm>
-          <a:prstGeom prst="rect">
-            <a:avLst/>
-          </a:prstGeom>
-        </p:spPr>
-      </p:pic>
-      <p:pic>
-        <p:nvPicPr>
-          <p:cNvPr id="10" name="Imagen 9">
-            <a:extLst>
-              <a:ext uri="{FF2B5EF4-FFF2-40B4-BE49-F238E27FC236}">
-                <a16:creationId xmlns:a16="http://schemas.microsoft.com/office/drawing/2014/main" id="{9E93C3DC-EA10-4E41-BDEF-6D23E1C605A2}"/>
-              </a:ext>
-            </a:extLst>
-          </p:cNvPr>
-          <p:cNvPicPr>
-            <a:picLocks noChangeAspect="1"/>
-          </p:cNvPicPr>
-          <p:nvPr/>
-        </p:nvPicPr>
-        <p:blipFill>
-          <a:blip r:embed="rId4" cstate="print">
-            <a:extLst>
-              <a:ext uri="{28A0092B-C50C-407E-A947-70E740481C1C}">
-                <a14:useLocalDpi xmlns:a14="http://schemas.microsoft.com/office/drawing/2010/main" val="0"/>
-              </a:ext>
-            </a:extLst>
-          </a:blip>
-          <a:stretch>
-            <a:fillRect/>
-          </a:stretch>
-        </p:blipFill>
-        <p:spPr>
-          <a:xfrm>
-            <a:off x="8269575" y="3388338"/>
-            <a:ext cx="910043" cy="436821"/>
-          </a:xfrm>
-          <a:prstGeom prst="rect">
-            <a:avLst/>
-          </a:prstGeom>
-        </p:spPr>
-      </p:pic>
-      <p:pic>
-        <p:nvPicPr>
-          <p:cNvPr id="18" name="Imagen 17">
-            <a:extLst>
-              <a:ext uri="{FF2B5EF4-FFF2-40B4-BE49-F238E27FC236}">
-                <a16:creationId xmlns:a16="http://schemas.microsoft.com/office/drawing/2014/main" id="{8646EEDC-88A1-4D49-A526-A92135A622F0}"/>
-              </a:ext>
-            </a:extLst>
-          </p:cNvPr>
-          <p:cNvPicPr>
-            <a:picLocks noChangeAspect="1"/>
-          </p:cNvPicPr>
-          <p:nvPr/>
-        </p:nvPicPr>
-        <p:blipFill>
-          <a:blip r:embed="rId5" cstate="print">
-            <a:extLst>
-              <a:ext uri="{28A0092B-C50C-407E-A947-70E740481C1C}">
-                <a14:useLocalDpi xmlns:a14="http://schemas.microsoft.com/office/drawing/2010/main" val="0"/>
-              </a:ext>
-            </a:extLst>
-          </a:blip>
-          <a:stretch>
-            <a:fillRect/>
-          </a:stretch>
-        </p:blipFill>
-        <p:spPr>
-          <a:xfrm>
-            <a:off x="9856922" y="3277209"/>
-            <a:ext cx="1426788" cy="784734"/>
-          </a:xfrm>
-          <a:prstGeom prst="rect">
-            <a:avLst/>
-          </a:prstGeom>
-        </p:spPr>
-      </p:pic>
-      <p:pic>
-        <p:nvPicPr>
-          <p:cNvPr id="20" name="Imagen 19">
-            <a:extLst>
-              <a:ext uri="{FF2B5EF4-FFF2-40B4-BE49-F238E27FC236}">
-                <a16:creationId xmlns:a16="http://schemas.microsoft.com/office/drawing/2014/main" id="{4A2D40FB-590B-4A55-B259-6C3ECBBC258F}"/>
-              </a:ext>
-            </a:extLst>
-          </p:cNvPr>
-          <p:cNvPicPr>
-            <a:picLocks noChangeAspect="1"/>
-          </p:cNvPicPr>
-          <p:nvPr/>
-        </p:nvPicPr>
-        <p:blipFill>
-          <a:blip r:embed="rId6" cstate="hqprint">
-            <a:extLst>
-              <a:ext uri="{28A0092B-C50C-407E-A947-70E740481C1C}">
-                <a14:useLocalDpi xmlns:a14="http://schemas.microsoft.com/office/drawing/2010/main" val="0"/>
-              </a:ext>
-            </a:extLst>
-          </a:blip>
-          <a:stretch>
-            <a:fillRect/>
-          </a:stretch>
-        </p:blipFill>
-        <p:spPr>
-          <a:xfrm>
-            <a:off x="8305876" y="4178163"/>
-            <a:ext cx="1099435" cy="579722"/>
-          </a:xfrm>
-          <a:prstGeom prst="rect">
-            <a:avLst/>
-          </a:prstGeom>
-        </p:spPr>
-      </p:pic>
-      <p:pic>
-        <p:nvPicPr>
-          <p:cNvPr id="22" name="Imagen 21">
-            <a:extLst>
-              <a:ext uri="{FF2B5EF4-FFF2-40B4-BE49-F238E27FC236}">
-                <a16:creationId xmlns:a16="http://schemas.microsoft.com/office/drawing/2014/main" id="{B2430BC3-AAE9-4FD6-9B04-9E1C8B7005EE}"/>
-              </a:ext>
-            </a:extLst>
-          </p:cNvPr>
-          <p:cNvPicPr>
-            <a:picLocks noChangeAspect="1"/>
-          </p:cNvPicPr>
-          <p:nvPr/>
-        </p:nvPicPr>
-        <p:blipFill>
-          <a:blip r:embed="rId7" cstate="hqprint">
-            <a:extLst>
-              <a:ext uri="{28A0092B-C50C-407E-A947-70E740481C1C}">
-                <a14:useLocalDpi xmlns:a14="http://schemas.microsoft.com/office/drawing/2010/main" val="0"/>
-              </a:ext>
-            </a:extLst>
-          </a:blip>
-          <a:stretch>
-            <a:fillRect/>
-          </a:stretch>
-        </p:blipFill>
-        <p:spPr>
-          <a:xfrm>
-            <a:off x="9932525" y="4031110"/>
-            <a:ext cx="1250771" cy="646211"/>
-          </a:xfrm>
-          <a:prstGeom prst="rect">
-            <a:avLst/>
-          </a:prstGeom>
-        </p:spPr>
-      </p:pic>
-      <p:grpSp>
-        <p:nvGrpSpPr>
-          <p:cNvPr id="25" name="Grupo 24">
-            <a:extLst>
-              <a:ext uri="{FF2B5EF4-FFF2-40B4-BE49-F238E27FC236}">
-                <a16:creationId xmlns:a16="http://schemas.microsoft.com/office/drawing/2014/main" id="{6FBCDE22-F651-45B0-99A1-055E6ABDF7ED}"/>
-              </a:ext>
-            </a:extLst>
-          </p:cNvPr>
-          <p:cNvGrpSpPr/>
-          <p:nvPr/>
-        </p:nvGrpSpPr>
-        <p:grpSpPr>
-          <a:xfrm>
-            <a:off x="8001483" y="2527063"/>
-            <a:ext cx="3376622" cy="579722"/>
-            <a:chOff x="8291959" y="2610964"/>
-            <a:chExt cx="3698522" cy="717692"/>
-          </a:xfrm>
-        </p:grpSpPr>
-        <p:pic>
-          <p:nvPicPr>
-            <p:cNvPr id="12" name="Imagen 11">
-              <a:extLst>
-                <a:ext uri="{FF2B5EF4-FFF2-40B4-BE49-F238E27FC236}">
-                  <a16:creationId xmlns:a16="http://schemas.microsoft.com/office/drawing/2014/main" id="{8EF366B3-0A5E-4158-883D-ADDFEF56C8D1}"/>
-                </a:ext>
-              </a:extLst>
-            </p:cNvPr>
-            <p:cNvPicPr>
-              <a:picLocks noChangeAspect="1"/>
-            </p:cNvPicPr>
-            <p:nvPr/>
-          </p:nvPicPr>
-          <p:blipFill>
-            <a:blip r:embed="rId8" cstate="print">
-              <a:extLst>
-                <a:ext uri="{28A0092B-C50C-407E-A947-70E740481C1C}">
-                  <a14:useLocalDpi xmlns:a14="http://schemas.microsoft.com/office/drawing/2010/main" val="0"/>
-                </a:ext>
-              </a:extLst>
-            </a:blip>
-            <a:stretch>
-              <a:fillRect/>
-            </a:stretch>
-          </p:blipFill>
-          <p:spPr>
-            <a:xfrm>
-              <a:off x="11408070" y="2692060"/>
-              <a:ext cx="582411" cy="582411"/>
-            </a:xfrm>
-            <a:prstGeom prst="rect">
-              <a:avLst/>
-            </a:prstGeom>
-          </p:spPr>
-        </p:pic>
-        <p:pic>
-          <p:nvPicPr>
-            <p:cNvPr id="14" name="Imagen 13">
-              <a:extLst>
-                <a:ext uri="{FF2B5EF4-FFF2-40B4-BE49-F238E27FC236}">
-                  <a16:creationId xmlns:a16="http://schemas.microsoft.com/office/drawing/2014/main" id="{16FD14F2-15D3-4DD2-9D3C-D16633A69E32}"/>
-                </a:ext>
-              </a:extLst>
-            </p:cNvPr>
-            <p:cNvPicPr>
-              <a:picLocks noChangeAspect="1"/>
-            </p:cNvPicPr>
-            <p:nvPr/>
-          </p:nvPicPr>
-          <p:blipFill>
-            <a:blip r:embed="rId9" cstate="print">
-              <a:extLst>
-                <a:ext uri="{28A0092B-C50C-407E-A947-70E740481C1C}">
-                  <a14:useLocalDpi xmlns:a14="http://schemas.microsoft.com/office/drawing/2010/main" val="0"/>
-                </a:ext>
-              </a:extLst>
-            </a:blip>
-            <a:stretch>
-              <a:fillRect/>
-            </a:stretch>
-          </p:blipFill>
-          <p:spPr>
-            <a:xfrm>
-              <a:off x="9449680" y="2610964"/>
-              <a:ext cx="472757" cy="666824"/>
-            </a:xfrm>
-            <a:prstGeom prst="rect">
-              <a:avLst/>
-            </a:prstGeom>
-          </p:spPr>
-        </p:pic>
-        <p:pic>
-          <p:nvPicPr>
-            <p:cNvPr id="16" name="Imagen 15">
-              <a:extLst>
-                <a:ext uri="{FF2B5EF4-FFF2-40B4-BE49-F238E27FC236}">
-                  <a16:creationId xmlns:a16="http://schemas.microsoft.com/office/drawing/2014/main" id="{F8D896A9-662E-4D9F-A70A-6AAF6F5C524E}"/>
-                </a:ext>
-              </a:extLst>
-            </p:cNvPr>
-            <p:cNvPicPr>
-              <a:picLocks noChangeAspect="1"/>
-            </p:cNvPicPr>
-            <p:nvPr/>
-          </p:nvPicPr>
-          <p:blipFill>
-            <a:blip r:embed="rId10" cstate="print">
-              <a:extLst>
-                <a:ext uri="{28A0092B-C50C-407E-A947-70E740481C1C}">
-                  <a14:useLocalDpi xmlns:a14="http://schemas.microsoft.com/office/drawing/2010/main" val="0"/>
-                </a:ext>
-              </a:extLst>
-            </a:blip>
-            <a:stretch>
-              <a:fillRect/>
-            </a:stretch>
-          </p:blipFill>
-          <p:spPr>
-            <a:xfrm>
-              <a:off x="8291959" y="2610964"/>
-              <a:ext cx="666824" cy="666824"/>
-            </a:xfrm>
-            <a:prstGeom prst="rect">
-              <a:avLst/>
-            </a:prstGeom>
-          </p:spPr>
-        </p:pic>
-        <p:pic>
-          <p:nvPicPr>
-            <p:cNvPr id="24" name="Imagen 23">
-              <a:extLst>
-                <a:ext uri="{FF2B5EF4-FFF2-40B4-BE49-F238E27FC236}">
-                  <a16:creationId xmlns:a16="http://schemas.microsoft.com/office/drawing/2014/main" id="{34384560-A72D-4409-8A84-1ED46309C9E6}"/>
-                </a:ext>
-              </a:extLst>
-            </p:cNvPr>
-            <p:cNvPicPr>
-              <a:picLocks noChangeAspect="1"/>
-            </p:cNvPicPr>
-            <p:nvPr/>
-          </p:nvPicPr>
-          <p:blipFill>
-            <a:blip r:embed="rId11" cstate="print">
-              <a:extLst>
-                <a:ext uri="{28A0092B-C50C-407E-A947-70E740481C1C}">
-                  <a14:useLocalDpi xmlns:a14="http://schemas.microsoft.com/office/drawing/2010/main" val="0"/>
-                </a:ext>
-              </a:extLst>
-            </a:blip>
-            <a:stretch>
-              <a:fillRect/>
-            </a:stretch>
-          </p:blipFill>
-          <p:spPr>
-            <a:xfrm>
-              <a:off x="10351230" y="2661832"/>
-              <a:ext cx="666824" cy="666824"/>
-            </a:xfrm>
-            <a:prstGeom prst="rect">
-              <a:avLst/>
-            </a:prstGeom>
-          </p:spPr>
-        </p:pic>
-      </p:grpSp>
+        <p:txBody>
+          <a:bodyPr>
+            <a:normAutofit/>
+          </a:bodyPr>
+          <a:lstStyle/>
+          <a:p>
+            <a:r>
+              <a:rPr lang="es-AR" sz="2000" dirty="0">
+                <a:latin typeface="Georgia" panose="02040502050405020303" pitchFamily="18" charset="0"/>
+              </a:rPr>
+              <a:t>Fecha: 12 de noviembre de 2019</a:t>
+            </a:r>
+          </a:p>
+          <a:p>
+            <a:pPr>
+              <a:buNone/>
+            </a:pPr>
+            <a:endParaRPr lang="es-AR" sz="2000" dirty="0">
+              <a:latin typeface="Georgia" panose="02040502050405020303" pitchFamily="18" charset="0"/>
+            </a:endParaRPr>
+          </a:p>
+          <a:p>
+            <a:r>
+              <a:rPr lang="es-AR" sz="2000" dirty="0">
+                <a:latin typeface="Georgia" panose="02040502050405020303" pitchFamily="18" charset="0"/>
+              </a:rPr>
+              <a:t>Método de presentación: presencial</a:t>
+            </a:r>
+          </a:p>
+          <a:p>
+            <a:pPr>
+              <a:buNone/>
+            </a:pPr>
+            <a:endParaRPr lang="es-AR" sz="2000" dirty="0">
+              <a:latin typeface="Georgia" panose="02040502050405020303" pitchFamily="18" charset="0"/>
+            </a:endParaRPr>
+          </a:p>
+          <a:p>
+            <a:r>
+              <a:rPr lang="es-AR" sz="2000" dirty="0">
+                <a:latin typeface="Georgia" panose="02040502050405020303" pitchFamily="18" charset="0"/>
+              </a:rPr>
+              <a:t>Temas tratados:</a:t>
+            </a:r>
+          </a:p>
+          <a:p>
+            <a:pPr lvl="1"/>
+            <a:r>
+              <a:rPr lang="es-AR" sz="1600" dirty="0">
+                <a:latin typeface="Georgia" panose="02040502050405020303" pitchFamily="18" charset="0"/>
+              </a:rPr>
+              <a:t>Mejora en gestión de vigencia </a:t>
+            </a:r>
+            <a:r>
+              <a:rPr lang="es-AR" sz="1600" dirty="0">
+                <a:latin typeface="Georgia" panose="02040502050405020303" pitchFamily="18" charset="0"/>
+                <a:sym typeface="Wingdings" panose="05000000000000000000" pitchFamily="2" charset="2"/>
+              </a:rPr>
+              <a:t> evitar que un programa se imprima todos los años</a:t>
+            </a:r>
+          </a:p>
+          <a:p>
+            <a:pPr lvl="1"/>
+            <a:r>
+              <a:rPr lang="es-AR" sz="1600" dirty="0">
+                <a:latin typeface="Georgia" panose="02040502050405020303" pitchFamily="18" charset="0"/>
+                <a:sym typeface="Wingdings" panose="05000000000000000000" pitchFamily="2" charset="2"/>
+              </a:rPr>
+              <a:t>Definiciones sobre casos particulares de Programas (asignaturas con comisiones, roles de docentes)</a:t>
+            </a:r>
+          </a:p>
+          <a:p>
+            <a:pPr lvl="1"/>
+            <a:r>
+              <a:rPr lang="es-AR" sz="1600" dirty="0">
+                <a:latin typeface="Georgia" panose="02040502050405020303" pitchFamily="18" charset="0"/>
+                <a:sym typeface="Wingdings" panose="05000000000000000000" pitchFamily="2" charset="2"/>
+              </a:rPr>
+              <a:t>Definiciones sobre CU Revisar Programa</a:t>
+            </a:r>
+          </a:p>
+          <a:p>
+            <a:pPr lvl="1"/>
+            <a:r>
+              <a:rPr lang="es-AR" sz="1600" dirty="0">
+                <a:latin typeface="Georgia" panose="02040502050405020303" pitchFamily="18" charset="0"/>
+                <a:sym typeface="Wingdings" panose="05000000000000000000" pitchFamily="2" charset="2"/>
+              </a:rPr>
+              <a:t>Utilización de cargas masivas de programas PDF como alternativa al uso esperado del sistema</a:t>
+            </a:r>
+          </a:p>
+          <a:p>
+            <a:pPr lvl="1"/>
+            <a:r>
+              <a:rPr lang="es-AR" sz="1600" dirty="0">
+                <a:latin typeface="Georgia" panose="02040502050405020303" pitchFamily="18" charset="0"/>
+                <a:sym typeface="Wingdings" panose="05000000000000000000" pitchFamily="2" charset="2"/>
+              </a:rPr>
+              <a:t>Surgimiento del CU Informe Gerencial </a:t>
+            </a:r>
+            <a:endParaRPr lang="es-AR" sz="1600" dirty="0">
+              <a:latin typeface="Georgia" panose="02040502050405020303" pitchFamily="18" charset="0"/>
+            </a:endParaRPr>
+          </a:p>
+          <a:p>
+            <a:pPr lvl="1"/>
+            <a:endParaRPr lang="es-AR" sz="1600" dirty="0">
+              <a:latin typeface="Georgia" panose="02040502050405020303" pitchFamily="18" charset="0"/>
+            </a:endParaRPr>
+          </a:p>
+          <a:p>
+            <a:pPr lvl="1"/>
+            <a:endParaRPr lang="es-AR" sz="1600" dirty="0">
+              <a:latin typeface="Georgia" panose="02040502050405020303" pitchFamily="18" charset="0"/>
+            </a:endParaRPr>
+          </a:p>
+        </p:txBody>
+      </p:sp>
     </p:spTree>
     <p:extLst>
       <p:ext uri="{BB962C8B-B14F-4D97-AF65-F5344CB8AC3E}">
-        <p14:creationId xmlns:p14="http://schemas.microsoft.com/office/powerpoint/2010/main" val="2893191071"/>
+        <p14:creationId xmlns:p14="http://schemas.microsoft.com/office/powerpoint/2010/main" val="4061512386"/>
       </p:ext>
     </p:extLst>
   </p:cSld>
   <p:clrMapOvr>
     <a:masterClrMapping/>
   </p:clrMapOvr>
-  <p:timing>
-    <p:tnLst>
-      <p:par>
-        <p:cTn id="1" dur="indefinite" restart="never" nodeType="tmRoot"/>
-      </p:par>
-    </p:tnLst>
-  </p:timing>
 </p:sld>
 </file>
 
@@ -9630,7 +9511,7 @@
           <p:cNvPr id="2" name="Título 1">
             <a:extLst>
               <a:ext uri="{FF2B5EF4-FFF2-40B4-BE49-F238E27FC236}">
-                <a16:creationId xmlns:a16="http://schemas.microsoft.com/office/drawing/2014/main" id="{0ED6D180-92C1-4333-BA91-2BBA4DD94A3B}"/>
+                <a16:creationId xmlns:a16="http://schemas.microsoft.com/office/drawing/2014/main" id="{6805CBC4-3E46-46E7-988A-BCA13DF60434}"/>
               </a:ext>
             </a:extLst>
           </p:cNvPr>
@@ -9643,8 +9524,8 @@
         </p:nvSpPr>
         <p:spPr>
           <a:xfrm>
-            <a:off x="1270000" y="61686"/>
-            <a:ext cx="10574997" cy="1752599"/>
+            <a:off x="1484310" y="712694"/>
+            <a:ext cx="10018713" cy="1752599"/>
           </a:xfrm>
         </p:spPr>
         <p:txBody>
@@ -9654,20 +9535,23 @@
           <a:lstStyle/>
           <a:p>
             <a:r>
-              <a:rPr lang="es-AR" sz="4000" dirty="0">
+              <a:rPr lang="es-ES" sz="4000" dirty="0">
                 <a:latin typeface="Georgia" panose="02040502050405020303" pitchFamily="18" charset="0"/>
               </a:rPr>
-              <a:t>Comparativa funcionamiento actual – futuro</a:t>
-            </a:r>
-          </a:p>
-        </p:txBody>
-      </p:sp>
-      <p:sp>
-        <p:nvSpPr>
-          <p:cNvPr id="6" name="Marcador de contenido 5">
+              <a:t>Avances desde la última presentación</a:t>
+            </a:r>
+            <a:endParaRPr lang="es-AR" sz="4000" dirty="0">
+              <a:latin typeface="Georgia" panose="02040502050405020303" pitchFamily="18" charset="0"/>
+            </a:endParaRPr>
+          </a:p>
+        </p:txBody>
+      </p:sp>
+      <p:sp>
+        <p:nvSpPr>
+          <p:cNvPr id="3" name="Marcador de contenido 2">
             <a:extLst>
               <a:ext uri="{FF2B5EF4-FFF2-40B4-BE49-F238E27FC236}">
-                <a16:creationId xmlns:a16="http://schemas.microsoft.com/office/drawing/2014/main" id="{EF5FF892-247B-4782-9E12-A9439F8D5681}"/>
+                <a16:creationId xmlns:a16="http://schemas.microsoft.com/office/drawing/2014/main" id="{1060A0EF-17F7-4622-A931-DD1D521EAE1E}"/>
               </a:ext>
             </a:extLst>
           </p:cNvPr>
@@ -9680,8 +9564,8 @@
         </p:nvSpPr>
         <p:spPr>
           <a:xfrm>
-            <a:off x="1484310" y="1872344"/>
-            <a:ext cx="10018713" cy="4812541"/>
+            <a:off x="1690498" y="2859741"/>
+            <a:ext cx="10018713" cy="3285565"/>
           </a:xfrm>
         </p:spPr>
         <p:txBody>
@@ -9694,159 +9578,59 @@
               <a:rPr lang="es-AR" sz="2000" dirty="0">
                 <a:latin typeface="Georgia" panose="02040502050405020303" pitchFamily="18" charset="0"/>
               </a:rPr>
-              <a:t>Actualmente:</a:t>
-            </a:r>
-          </a:p>
-          <a:p>
-            <a:pPr lvl="1"/>
-            <a:r>
-              <a:rPr lang="es-AR" sz="1800" dirty="0">
+              <a:t>Diseño e implementación de CU restantes (Revisar Programa, Carga Masiva, etc.)</a:t>
+            </a:r>
+          </a:p>
+          <a:p>
+            <a:r>
+              <a:rPr lang="es-AR" sz="2000" dirty="0">
                 <a:latin typeface="Georgia" panose="02040502050405020303" pitchFamily="18" charset="0"/>
               </a:rPr>
-              <a:t>Los profesores completan el programa de la asignatura en un documento Word.</a:t>
-            </a:r>
-          </a:p>
-          <a:p>
-            <a:pPr lvl="1"/>
-            <a:r>
-              <a:rPr lang="es-AR" sz="1800" dirty="0">
+              <a:t>Cambios mínimos en la estructura de la BD</a:t>
+            </a:r>
+          </a:p>
+          <a:p>
+            <a:r>
+              <a:rPr lang="es-AR" sz="2000" dirty="0">
                 <a:latin typeface="Georgia" panose="02040502050405020303" pitchFamily="18" charset="0"/>
               </a:rPr>
-              <a:t>Empleado de SA cuenta con una hoja de cálculo en donde tiene un registro de los programas de asignaturas con su correspondiente vigencia, profesor responsable.</a:t>
-            </a:r>
-          </a:p>
-          <a:p>
-            <a:pPr lvl="1"/>
-            <a:r>
-              <a:rPr lang="es-AR" sz="1800" dirty="0">
+              <a:t>Integración Usuario-Profesor</a:t>
+            </a:r>
+          </a:p>
+          <a:p>
+            <a:r>
+              <a:rPr lang="es-AR" sz="2000" dirty="0">
                 <a:latin typeface="Georgia" panose="02040502050405020303" pitchFamily="18" charset="0"/>
               </a:rPr>
-              <a:t>Se solicita el programa (actualización o uno nuevo) al profesor mediante correo.</a:t>
-            </a:r>
-          </a:p>
-          <a:p>
-            <a:pPr lvl="1"/>
-            <a:r>
-              <a:rPr lang="es-AR" sz="1800" dirty="0">
+              <a:t>Avance en pruebas y documentación</a:t>
+            </a:r>
+          </a:p>
+          <a:p>
+            <a:r>
+              <a:rPr lang="es-AR" sz="2000" dirty="0">
                 <a:latin typeface="Georgia" panose="02040502050405020303" pitchFamily="18" charset="0"/>
               </a:rPr>
-              <a:t>Los programas son revisados tanto por SA como el director del departamento correspondiente.</a:t>
-            </a:r>
-          </a:p>
-          <a:p>
-            <a:pPr lvl="1"/>
-            <a:r>
-              <a:rPr lang="es-AR" sz="1800" dirty="0">
-                <a:latin typeface="Georgia" panose="02040502050405020303" pitchFamily="18" charset="0"/>
-              </a:rPr>
-              <a:t>No hay un seguimiento de los programas.</a:t>
-            </a:r>
-          </a:p>
-          <a:p>
-            <a:pPr lvl="1"/>
-            <a:r>
-              <a:rPr lang="es-AR" sz="1800" dirty="0">
-                <a:latin typeface="Georgia" panose="02040502050405020303" pitchFamily="18" charset="0"/>
-              </a:rPr>
-              <a:t>No hay un proceso definido para la firma de las autoridades:</a:t>
-            </a:r>
-          </a:p>
-          <a:p>
-            <a:pPr lvl="2"/>
-            <a:r>
-              <a:rPr lang="es-AR" dirty="0">
-                <a:latin typeface="Georgia" panose="02040502050405020303" pitchFamily="18" charset="0"/>
-              </a:rPr>
-              <a:t>SA  </a:t>
-            </a:r>
-            <a:r>
-              <a:rPr lang="es-AR" dirty="0">
-                <a:latin typeface="Georgia" panose="02040502050405020303" pitchFamily="18" charset="0"/>
-                <a:sym typeface="Wingdings" panose="05000000000000000000" pitchFamily="2" charset="2"/>
-              </a:rPr>
-              <a:t> </a:t>
-            </a:r>
-            <a:r>
-              <a:rPr lang="es-AR" dirty="0">
-                <a:latin typeface="Georgia" panose="02040502050405020303" pitchFamily="18" charset="0"/>
-              </a:rPr>
-              <a:t>Departamento</a:t>
-            </a:r>
-          </a:p>
-          <a:p>
-            <a:pPr lvl="2"/>
-            <a:r>
-              <a:rPr lang="es-AR" dirty="0">
-                <a:latin typeface="Georgia" panose="02040502050405020303" pitchFamily="18" charset="0"/>
-              </a:rPr>
-              <a:t>Departamento </a:t>
-            </a:r>
-            <a:r>
-              <a:rPr lang="es-AR" dirty="0">
-                <a:latin typeface="Georgia" panose="02040502050405020303" pitchFamily="18" charset="0"/>
-                <a:sym typeface="Wingdings" panose="05000000000000000000" pitchFamily="2" charset="2"/>
-              </a:rPr>
-              <a:t></a:t>
-            </a:r>
-            <a:r>
-              <a:rPr lang="es-AR" dirty="0">
-                <a:latin typeface="Georgia" panose="02040502050405020303" pitchFamily="18" charset="0"/>
-              </a:rPr>
-              <a:t>  SA</a:t>
-            </a:r>
-          </a:p>
-          <a:p>
-            <a:pPr lvl="1"/>
-            <a:r>
-              <a:rPr lang="es-AR" sz="1800" dirty="0">
-                <a:latin typeface="Georgia" panose="02040502050405020303" pitchFamily="18" charset="0"/>
-              </a:rPr>
-              <a:t>Programa digitalizado y el original es guardado en un </a:t>
-            </a:r>
-            <a:r>
-              <a:rPr lang="es-AR" sz="1800" dirty="0" err="1">
-                <a:latin typeface="Georgia" panose="02040502050405020303" pitchFamily="18" charset="0"/>
-              </a:rPr>
-              <a:t>bibliorato</a:t>
-            </a:r>
-            <a:r>
-              <a:rPr lang="es-AR" sz="1800" dirty="0">
-                <a:latin typeface="Georgia" panose="02040502050405020303" pitchFamily="18" charset="0"/>
-              </a:rPr>
-              <a:t>.</a:t>
-            </a:r>
-          </a:p>
-          <a:p>
-            <a:pPr lvl="1"/>
-            <a:endParaRPr lang="es-AR" dirty="0">
-              <a:latin typeface="Georgia" panose="02040502050405020303" pitchFamily="18" charset="0"/>
-            </a:endParaRPr>
-          </a:p>
-          <a:p>
-            <a:pPr lvl="1"/>
-            <a:endParaRPr lang="es-AR" dirty="0">
-              <a:latin typeface="Georgia" panose="02040502050405020303" pitchFamily="18" charset="0"/>
-            </a:endParaRPr>
+              <a:t>Rediseño de pantalla de inicio del sistema</a:t>
+            </a:r>
+          </a:p>
+          <a:p>
+            <a:pPr marL="0" indent="0">
+              <a:buNone/>
+            </a:pPr>
+            <a:endParaRPr lang="es-AR" dirty="0"/>
           </a:p>
         </p:txBody>
       </p:sp>
     </p:spTree>
     <p:extLst>
       <p:ext uri="{BB962C8B-B14F-4D97-AF65-F5344CB8AC3E}">
-        <p14:creationId xmlns:p14="http://schemas.microsoft.com/office/powerpoint/2010/main" val="4239479209"/>
+        <p14:creationId xmlns:p14="http://schemas.microsoft.com/office/powerpoint/2010/main" val="1105214633"/>
       </p:ext>
     </p:extLst>
   </p:cSld>
   <p:clrMapOvr>
     <a:masterClrMapping/>
   </p:clrMapOvr>
-  <p:timing>
-    <p:tnLst>
-      <p:par>
-        <p:cTn id="1" dur="indefinite" restart="never" nodeType="tmRoot"/>
-      </p:par>
-    </p:tnLst>
-  </p:timing>
 </p:sld>
 </file>
 
@@ -9885,73 +9669,134 @@
         </p:nvSpPr>
         <p:spPr>
           <a:xfrm>
-            <a:off x="1484311" y="0"/>
-            <a:ext cx="10360686" cy="1752599"/>
+            <a:off x="1270000" y="61686"/>
+            <a:ext cx="10574997" cy="1752599"/>
           </a:xfrm>
         </p:spPr>
         <p:txBody>
-          <a:bodyPr/>
+          <a:bodyPr>
+            <a:normAutofit/>
+          </a:bodyPr>
           <a:lstStyle/>
           <a:p>
             <a:r>
-              <a:rPr lang="es-AR" dirty="0"/>
-              <a:t>Comparativa funcionamiento actual - futuro </a:t>
-            </a:r>
-          </a:p>
-        </p:txBody>
-      </p:sp>
-      <p:pic>
-        <p:nvPicPr>
-          <p:cNvPr id="13" name="Marcador de contenido 12">
+              <a:rPr lang="es-AR" sz="4000" dirty="0">
+                <a:latin typeface="Georgia" panose="02040502050405020303" pitchFamily="18" charset="0"/>
+              </a:rPr>
+              <a:t>Resumen del último encuentro</a:t>
+            </a:r>
+          </a:p>
+        </p:txBody>
+      </p:sp>
+      <p:sp>
+        <p:nvSpPr>
+          <p:cNvPr id="6" name="Marcador de contenido 5">
             <a:extLst>
               <a:ext uri="{FF2B5EF4-FFF2-40B4-BE49-F238E27FC236}">
-                <a16:creationId xmlns:a16="http://schemas.microsoft.com/office/drawing/2014/main" id="{CEA8B96E-5837-4A4D-A606-8D01BA9A3D3E}"/>
+                <a16:creationId xmlns:a16="http://schemas.microsoft.com/office/drawing/2014/main" id="{EF5FF892-247B-4782-9E12-A9439F8D5681}"/>
               </a:ext>
             </a:extLst>
           </p:cNvPr>
-          <p:cNvPicPr>
-            <a:picLocks noGrp="1" noChangeAspect="1"/>
-          </p:cNvPicPr>
+          <p:cNvSpPr>
+            <a:spLocks noGrp="1"/>
+          </p:cNvSpPr>
           <p:nvPr>
             <p:ph idx="1"/>
           </p:nvPr>
-        </p:nvPicPr>
-        <p:blipFill>
-          <a:blip r:embed="rId2" cstate="print">
-            <a:extLst>
-              <a:ext uri="{28A0092B-C50C-407E-A947-70E740481C1C}">
-                <a14:useLocalDpi xmlns:a14="http://schemas.microsoft.com/office/drawing/2010/main" val="0"/>
-              </a:ext>
-            </a:extLst>
-          </a:blip>
-          <a:stretch>
-            <a:fillRect/>
-          </a:stretch>
-        </p:blipFill>
+        </p:nvSpPr>
         <p:spPr>
           <a:xfrm>
-            <a:off x="1384300" y="1308100"/>
-            <a:ext cx="10807700" cy="5549900"/>
+            <a:off x="1548141" y="1480569"/>
+            <a:ext cx="10018713" cy="3896861"/>
           </a:xfrm>
         </p:spPr>
-      </p:pic>
+        <p:txBody>
+          <a:bodyPr>
+            <a:normAutofit/>
+          </a:bodyPr>
+          <a:lstStyle/>
+          <a:p>
+            <a:r>
+              <a:rPr lang="es-AR" sz="2000" dirty="0">
+                <a:latin typeface="Georgia" panose="02040502050405020303" pitchFamily="18" charset="0"/>
+              </a:rPr>
+              <a:t>Fecha y hora: 24 de Junio de 2020</a:t>
+            </a:r>
+          </a:p>
+          <a:p>
+            <a:pPr>
+              <a:buNone/>
+            </a:pPr>
+            <a:endParaRPr lang="es-AR" sz="2000" dirty="0">
+              <a:latin typeface="Georgia" panose="02040502050405020303" pitchFamily="18" charset="0"/>
+            </a:endParaRPr>
+          </a:p>
+          <a:p>
+            <a:r>
+              <a:rPr lang="es-AR" sz="2000" dirty="0">
+                <a:latin typeface="Georgia" panose="02040502050405020303" pitchFamily="18" charset="0"/>
+              </a:rPr>
+              <a:t>Método de reunión: virtual (Google </a:t>
+            </a:r>
+            <a:r>
+              <a:rPr lang="es-AR" sz="2000" dirty="0" err="1">
+                <a:latin typeface="Georgia" panose="02040502050405020303" pitchFamily="18" charset="0"/>
+              </a:rPr>
+              <a:t>Meet</a:t>
+            </a:r>
+            <a:r>
+              <a:rPr lang="es-AR" sz="2000" dirty="0">
+                <a:latin typeface="Georgia" panose="02040502050405020303" pitchFamily="18" charset="0"/>
+              </a:rPr>
+              <a:t>)</a:t>
+            </a:r>
+          </a:p>
+          <a:p>
+            <a:pPr>
+              <a:buNone/>
+            </a:pPr>
+            <a:endParaRPr lang="es-AR" sz="2000" dirty="0">
+              <a:latin typeface="Georgia" panose="02040502050405020303" pitchFamily="18" charset="0"/>
+            </a:endParaRPr>
+          </a:p>
+          <a:p>
+            <a:r>
+              <a:rPr lang="es-AR" sz="2000" dirty="0">
+                <a:latin typeface="Georgia" panose="02040502050405020303" pitchFamily="18" charset="0"/>
+              </a:rPr>
+              <a:t>Temas tratados:</a:t>
+            </a:r>
+          </a:p>
+          <a:p>
+            <a:pPr lvl="1"/>
+            <a:r>
+              <a:rPr lang="es-AR" sz="1600" dirty="0">
+                <a:latin typeface="Georgia" panose="02040502050405020303" pitchFamily="18" charset="0"/>
+              </a:rPr>
+              <a:t>Consultas sobre gestión de Planes</a:t>
+            </a:r>
+          </a:p>
+          <a:p>
+            <a:pPr lvl="1"/>
+            <a:r>
+              <a:rPr lang="es-AR" sz="1600" dirty="0">
+                <a:latin typeface="Georgia" panose="02040502050405020303" pitchFamily="18" charset="0"/>
+              </a:rPr>
+              <a:t>Presentación oral del CU Generar Informe Gerencial</a:t>
+            </a:r>
+          </a:p>
+        </p:txBody>
+      </p:sp>
     </p:spTree>
     <p:extLst>
       <p:ext uri="{BB962C8B-B14F-4D97-AF65-F5344CB8AC3E}">
-        <p14:creationId xmlns:p14="http://schemas.microsoft.com/office/powerpoint/2010/main" val="4165342321"/>
+        <p14:creationId xmlns:p14="http://schemas.microsoft.com/office/powerpoint/2010/main" val="4069744757"/>
       </p:ext>
     </p:extLst>
   </p:cSld>
   <p:clrMapOvr>
     <a:masterClrMapping/>
   </p:clrMapOvr>
-  <p:timing>
-    <p:tnLst>
-      <p:par>
-        <p:cTn id="1" dur="indefinite" restart="never" nodeType="tmRoot"/>
-      </p:par>
-    </p:tnLst>
-  </p:timing>
 </p:sld>
 </file>
 
@@ -9977,7 +9822,7 @@
           <p:cNvPr id="2" name="Título 1">
             <a:extLst>
               <a:ext uri="{FF2B5EF4-FFF2-40B4-BE49-F238E27FC236}">
-                <a16:creationId xmlns:a16="http://schemas.microsoft.com/office/drawing/2014/main" id="{48E5154C-DCCF-4EF4-A599-6C5F443E3B7E}"/>
+                <a16:creationId xmlns:a16="http://schemas.microsoft.com/office/drawing/2014/main" id="{6805CBC4-3E46-46E7-988A-BCA13DF60434}"/>
               </a:ext>
             </a:extLst>
           </p:cNvPr>
@@ -9990,18 +9835,25 @@
         </p:nvSpPr>
         <p:spPr>
           <a:xfrm>
-            <a:off x="1252025" y="685800"/>
-            <a:ext cx="10508566" cy="1752599"/>
+            <a:off x="1717392" y="381000"/>
+            <a:ext cx="10018713" cy="1752599"/>
           </a:xfrm>
         </p:spPr>
         <p:txBody>
-          <a:bodyPr/>
+          <a:bodyPr>
+            <a:normAutofit/>
+          </a:bodyPr>
           <a:lstStyle/>
           <a:p>
             <a:r>
-              <a:rPr lang="es-AR" dirty="0"/>
-              <a:t>Comparativa funcionamiento actual - futuro</a:t>
-            </a:r>
+              <a:rPr lang="es-ES" sz="4000" dirty="0">
+                <a:latin typeface="Georgia" panose="02040502050405020303" pitchFamily="18" charset="0"/>
+              </a:rPr>
+              <a:t>Avances desde el último encuentro</a:t>
+            </a:r>
+            <a:endParaRPr lang="es-AR" sz="4000" dirty="0">
+              <a:latin typeface="Georgia" panose="02040502050405020303" pitchFamily="18" charset="0"/>
+            </a:endParaRPr>
           </a:p>
         </p:txBody>
       </p:sp>
@@ -10010,7 +9862,7 @@
           <p:cNvPr id="3" name="Marcador de contenido 2">
             <a:extLst>
               <a:ext uri="{FF2B5EF4-FFF2-40B4-BE49-F238E27FC236}">
-                <a16:creationId xmlns:a16="http://schemas.microsoft.com/office/drawing/2014/main" id="{CE1A4805-831B-4F38-AD2E-0BA47901F15D}"/>
+                <a16:creationId xmlns:a16="http://schemas.microsoft.com/office/drawing/2014/main" id="{1060A0EF-17F7-4622-A931-DD1D521EAE1E}"/>
               </a:ext>
             </a:extLst>
           </p:cNvPr>
@@ -10024,94 +9876,62 @@
         <p:spPr/>
         <p:txBody>
           <a:bodyPr>
-            <a:normAutofit fontScale="92500" lnSpcReduction="20000"/>
+            <a:noAutofit/>
           </a:bodyPr>
           <a:lstStyle/>
           <a:p>
             <a:r>
-              <a:rPr lang="es-AR" sz="2100" dirty="0"/>
-              <a:t>Ventajas generales del Sistema VASPA:</a:t>
+              <a:rPr lang="es-AR" sz="1800" dirty="0">
+                <a:latin typeface="Georgia" pitchFamily="18" charset="0"/>
+              </a:rPr>
+              <a:t>Modificación/ reestructuración del CU Gestionar Plan</a:t>
             </a:r>
           </a:p>
           <a:p>
             <a:pPr lvl="1"/>
             <a:r>
-              <a:rPr lang="es-AR" sz="2100" dirty="0"/>
-              <a:t>Registros de las notificaciones enviadas a docentes </a:t>
-            </a:r>
-            <a:r>
-              <a:rPr lang="es-AR" sz="2100" dirty="0">
-                <a:sym typeface="Wingdings" panose="05000000000000000000" pitchFamily="2" charset="2"/>
+              <a:rPr lang="es-AR" sz="1800" dirty="0">
+                <a:latin typeface="Georgia" pitchFamily="18" charset="0"/>
               </a:rPr>
-              <a:t> Mayor control</a:t>
-            </a:r>
-            <a:endParaRPr lang="es-AR" sz="2100" dirty="0"/>
-          </a:p>
-          <a:p>
-            <a:pPr lvl="1"/>
-            <a:r>
-              <a:rPr lang="es-AR" sz="2100" dirty="0"/>
-              <a:t>Democratización del acceso a la información </a:t>
-            </a:r>
-          </a:p>
-          <a:p>
-            <a:pPr lvl="1"/>
-            <a:r>
-              <a:rPr lang="es-AR" sz="2100" dirty="0"/>
-              <a:t>Mayor eficiencia en el uso de recursos de la </a:t>
-            </a:r>
-            <a:r>
-              <a:rPr lang="es-AR" sz="2100" dirty="0" smtClean="0"/>
-              <a:t>universidad</a:t>
-            </a:r>
-          </a:p>
-          <a:p>
-            <a:pPr lvl="1"/>
-            <a:endParaRPr lang="es-AR" sz="2100" dirty="0"/>
-          </a:p>
-          <a:p>
-            <a:r>
-              <a:rPr lang="es-AR" sz="2100" dirty="0" smtClean="0"/>
-              <a:t>Beneficios extra:</a:t>
-            </a:r>
-          </a:p>
-          <a:p>
-            <a:pPr lvl="1"/>
-            <a:r>
-              <a:rPr lang="es-AR" sz="2100" dirty="0" smtClean="0"/>
-              <a:t>Existencia de una BD con carreras, planes, asignaturas, docentes, etc.</a:t>
-            </a:r>
-          </a:p>
-          <a:p>
-            <a:pPr lvl="1"/>
-            <a:r>
-              <a:rPr lang="es-AR" sz="2100" dirty="0" smtClean="0"/>
-              <a:t>Acceso sencillo al historial de planes de una carrera</a:t>
-            </a:r>
-            <a:endParaRPr lang="es-AR" sz="2100" dirty="0"/>
-          </a:p>
-          <a:p>
-            <a:endParaRPr lang="es-AR" dirty="0"/>
+              <a:t>Incluye además reestructuración de la vinculación Plan – Asignaturas y la gestión de correlatividades</a:t>
+            </a:r>
+          </a:p>
+          <a:p>
+            <a:r>
+              <a:rPr lang="es-AR" sz="1800" dirty="0">
+                <a:latin typeface="Georgia" pitchFamily="18" charset="0"/>
+              </a:rPr>
+              <a:t>Actualización de documentación</a:t>
+            </a:r>
+          </a:p>
+          <a:p>
+            <a:r>
+              <a:rPr lang="es-AR" sz="1800" dirty="0">
+                <a:latin typeface="Georgia" pitchFamily="18" charset="0"/>
+              </a:rPr>
+              <a:t>Implementación del CU Generar Informe Gerencial</a:t>
+            </a:r>
+          </a:p>
+          <a:p>
+            <a:r>
+              <a:rPr lang="es-AR" sz="1800" dirty="0">
+                <a:latin typeface="Georgia" pitchFamily="18" charset="0"/>
+              </a:rPr>
+              <a:t>Reimplementación de la aplicación móvil</a:t>
+            </a:r>
           </a:p>
         </p:txBody>
       </p:sp>
     </p:spTree>
     <p:extLst>
       <p:ext uri="{BB962C8B-B14F-4D97-AF65-F5344CB8AC3E}">
-        <p14:creationId xmlns:p14="http://schemas.microsoft.com/office/powerpoint/2010/main" val="3912988033"/>
+        <p14:creationId xmlns:p14="http://schemas.microsoft.com/office/powerpoint/2010/main" val="2451729633"/>
       </p:ext>
     </p:extLst>
   </p:cSld>
   <p:clrMapOvr>
     <a:masterClrMapping/>
   </p:clrMapOvr>
-  <p:timing>
-    <p:tnLst>
-      <p:par>
-        <p:cTn id="1" dur="indefinite" restart="never" nodeType="tmRoot"/>
-      </p:par>
-    </p:tnLst>
-  </p:timing>
 </p:sld>
 </file>
 
@@ -10146,8 +9966,8 @@
         </p:nvSpPr>
         <p:spPr>
           <a:xfrm>
-            <a:off x="1735810" y="2142688"/>
-            <a:ext cx="9934413" cy="2339102"/>
+            <a:off x="1493763" y="1586876"/>
+            <a:ext cx="9934413" cy="2554545"/>
           </a:xfrm>
           <a:prstGeom prst="rect">
             <a:avLst/>
@@ -10162,7 +9982,7 @@
           <a:p>
             <a:pPr algn="ctr"/>
             <a:r>
-              <a:rPr lang="es-ES" sz="8000" b="1" dirty="0" smtClean="0">
+              <a:rPr lang="es-ES" sz="8000" b="1" dirty="0">
                 <a:ln w="0"/>
                 <a:solidFill>
                   <a:schemeClr val="accent1"/>
@@ -10175,12 +9995,9 @@
                   </a:outerShdw>
                 </a:effectLst>
               </a:rPr>
-              <a:t>Estado del Proyecto</a:t>
-            </a:r>
-          </a:p>
-          <a:p>
-            <a:pPr algn="ctr"/>
-            <a:endParaRPr lang="es-ES" sz="6600" b="1" dirty="0" smtClean="0">
+              <a:t>Casos de Uso del Sistema</a:t>
+            </a:r>
+            <a:endParaRPr lang="es-ES" sz="6600" b="1" dirty="0">
               <a:ln w="0"/>
               <a:solidFill>
                 <a:schemeClr val="accent1"/>
@@ -10206,13 +10023,6 @@
   <p:clrMapOvr>
     <a:masterClrMapping/>
   </p:clrMapOvr>
-  <p:timing>
-    <p:tnLst>
-      <p:par>
-        <p:cTn id="1" dur="indefinite" restart="never" nodeType="tmRoot"/>
-      </p:par>
-    </p:tnLst>
-  </p:timing>
 </p:sld>
 </file>
 
@@ -10250,8 +10060,8 @@
         </p:blipFill>
         <p:spPr bwMode="auto">
           <a:xfrm>
-            <a:off x="6158236" y="1721721"/>
-            <a:ext cx="6000751" cy="4980919"/>
+            <a:off x="0" y="1"/>
+            <a:ext cx="12192000" cy="6858000"/>
           </a:xfrm>
           <a:prstGeom prst="rect">
             <a:avLst/>
@@ -10259,236 +10069,6 @@
           <a:noFill/>
         </p:spPr>
       </p:pic>
-      <p:sp>
-        <p:nvSpPr>
-          <p:cNvPr id="5" name="4 CuadroTexto"/>
-          <p:cNvSpPr txBox="1"/>
-          <p:nvPr/>
-        </p:nvSpPr>
-        <p:spPr>
-          <a:xfrm>
-            <a:off x="2639286" y="2121832"/>
-            <a:ext cx="3620449" cy="2031325"/>
-          </a:xfrm>
-          <a:prstGeom prst="rect">
-            <a:avLst/>
-          </a:prstGeom>
-          <a:noFill/>
-        </p:spPr>
-        <p:txBody>
-          <a:bodyPr wrap="square" rtlCol="0">
-            <a:spAutoFit/>
-          </a:bodyPr>
-          <a:lstStyle/>
-          <a:p>
-            <a:r>
-              <a:rPr lang="es-AR" dirty="0" smtClean="0">
-                <a:latin typeface="Georgia" panose="02040502050405020303" pitchFamily="18" charset="0"/>
-              </a:rPr>
-              <a:t>3 Casos de Uso:</a:t>
-            </a:r>
-          </a:p>
-          <a:p>
-            <a:pPr marL="285750" indent="-285750">
-              <a:buFont typeface="Arial" panose="020B0604020202020204" pitchFamily="34" charset="0"/>
-              <a:buChar char="•"/>
-            </a:pPr>
-            <a:r>
-              <a:rPr lang="es-AR" dirty="0" smtClean="0">
-                <a:latin typeface="Georgia" panose="02040502050405020303" pitchFamily="18" charset="0"/>
-              </a:rPr>
-              <a:t>Ingresar al Sistema</a:t>
-            </a:r>
-          </a:p>
-          <a:p>
-            <a:pPr marL="285750" indent="-285750">
-              <a:buFont typeface="Arial" panose="020B0604020202020204" pitchFamily="34" charset="0"/>
-              <a:buChar char="•"/>
-            </a:pPr>
-            <a:r>
-              <a:rPr lang="es-AR" dirty="0" smtClean="0">
-                <a:latin typeface="Georgia" panose="02040502050405020303" pitchFamily="18" charset="0"/>
-              </a:rPr>
-              <a:t>Visualizar Programa</a:t>
-            </a:r>
-          </a:p>
-          <a:p>
-            <a:pPr marL="285750" indent="-285750">
-              <a:buFont typeface="Arial" panose="020B0604020202020204" pitchFamily="34" charset="0"/>
-              <a:buChar char="•"/>
-            </a:pPr>
-            <a:r>
-              <a:rPr lang="es-AR" dirty="0" smtClean="0">
-                <a:latin typeface="Georgia" panose="02040502050405020303" pitchFamily="18" charset="0"/>
-              </a:rPr>
-              <a:t>Visualizar Plan</a:t>
-            </a:r>
-          </a:p>
-          <a:p>
-            <a:endParaRPr lang="es-AR" dirty="0" smtClean="0">
-              <a:latin typeface="Georgia" panose="02040502050405020303" pitchFamily="18" charset="0"/>
-            </a:endParaRPr>
-          </a:p>
-          <a:p>
-            <a:r>
-              <a:rPr lang="es-AR" dirty="0" smtClean="0">
-                <a:latin typeface="Georgia" panose="02040502050405020303" pitchFamily="18" charset="0"/>
-              </a:rPr>
-              <a:t>Los 3 CU se encuentran cerrados. Implementados y probados</a:t>
-            </a:r>
-          </a:p>
-        </p:txBody>
-      </p:sp>
-      <p:sp>
-        <p:nvSpPr>
-          <p:cNvPr id="6" name="Título 1"/>
-          <p:cNvSpPr txBox="1">
-            <a:spLocks/>
-          </p:cNvSpPr>
-          <p:nvPr/>
-        </p:nvSpPr>
-        <p:spPr>
-          <a:xfrm>
-            <a:off x="1476728" y="-492071"/>
-            <a:ext cx="10018713" cy="1752599"/>
-          </a:xfrm>
-          <a:prstGeom prst="rect">
-            <a:avLst/>
-          </a:prstGeom>
-          <a:effectLst/>
-        </p:spPr>
-        <p:txBody>
-          <a:bodyPr vert="horz" lIns="91440" tIns="45720" rIns="91440" bIns="45720" rtlCol="0" anchor="b">
-            <a:normAutofit/>
-          </a:bodyPr>
-          <a:lstStyle>
-            <a:lvl1pPr algn="r" defTabSz="457200" rtl="0" eaLnBrk="1" latinLnBrk="0" hangingPunct="1">
-              <a:spcBef>
-                <a:spcPct val="0"/>
-              </a:spcBef>
-              <a:buNone/>
-              <a:defRPr sz="6000" kern="1200" cap="none">
-                <a:ln w="3175" cmpd="sng">
-                  <a:noFill/>
-                </a:ln>
-                <a:solidFill>
-                  <a:schemeClr val="tx1"/>
-                </a:solidFill>
-                <a:effectLst/>
-                <a:latin typeface="+mj-lt"/>
-                <a:ea typeface="+mj-ea"/>
-                <a:cs typeface="+mj-cs"/>
-              </a:defRPr>
-            </a:lvl1pPr>
-            <a:lvl2pPr eaLnBrk="1" hangingPunct="1">
-              <a:defRPr>
-                <a:solidFill>
-                  <a:schemeClr val="tx2"/>
-                </a:solidFill>
-              </a:defRPr>
-            </a:lvl2pPr>
-            <a:lvl3pPr eaLnBrk="1" hangingPunct="1">
-              <a:defRPr>
-                <a:solidFill>
-                  <a:schemeClr val="tx2"/>
-                </a:solidFill>
-              </a:defRPr>
-            </a:lvl3pPr>
-            <a:lvl4pPr eaLnBrk="1" hangingPunct="1">
-              <a:defRPr>
-                <a:solidFill>
-                  <a:schemeClr val="tx2"/>
-                </a:solidFill>
-              </a:defRPr>
-            </a:lvl4pPr>
-            <a:lvl5pPr eaLnBrk="1" hangingPunct="1">
-              <a:defRPr>
-                <a:solidFill>
-                  <a:schemeClr val="tx2"/>
-                </a:solidFill>
-              </a:defRPr>
-            </a:lvl5pPr>
-            <a:lvl6pPr eaLnBrk="1" hangingPunct="1">
-              <a:defRPr>
-                <a:solidFill>
-                  <a:schemeClr val="tx2"/>
-                </a:solidFill>
-              </a:defRPr>
-            </a:lvl6pPr>
-            <a:lvl7pPr eaLnBrk="1" hangingPunct="1">
-              <a:defRPr>
-                <a:solidFill>
-                  <a:schemeClr val="tx2"/>
-                </a:solidFill>
-              </a:defRPr>
-            </a:lvl7pPr>
-            <a:lvl8pPr eaLnBrk="1" hangingPunct="1">
-              <a:defRPr>
-                <a:solidFill>
-                  <a:schemeClr val="tx2"/>
-                </a:solidFill>
-              </a:defRPr>
-            </a:lvl8pPr>
-            <a:lvl9pPr eaLnBrk="1" hangingPunct="1">
-              <a:defRPr>
-                <a:solidFill>
-                  <a:schemeClr val="tx2"/>
-                </a:solidFill>
-              </a:defRPr>
-            </a:lvl9pPr>
-          </a:lstStyle>
-          <a:p>
-            <a:r>
-              <a:rPr lang="es-ES" sz="4800" dirty="0" smtClean="0"/>
-              <a:t>Estado del Sistema – Vista por actor I</a:t>
-            </a:r>
-            <a:r>
-              <a:rPr lang="es-ES" dirty="0" smtClean="0"/>
-              <a:t>	</a:t>
-            </a:r>
-            <a:endParaRPr lang="en-US" dirty="0"/>
-          </a:p>
-        </p:txBody>
-      </p:sp>
-      <p:sp>
-        <p:nvSpPr>
-          <p:cNvPr id="3" name="Rectángulo 2"/>
-          <p:cNvSpPr/>
-          <p:nvPr/>
-        </p:nvSpPr>
-        <p:spPr>
-          <a:xfrm>
-            <a:off x="2603775" y="1660639"/>
-            <a:ext cx="3554461" cy="400110"/>
-          </a:xfrm>
-          <a:prstGeom prst="rect">
-            <a:avLst/>
-          </a:prstGeom>
-        </p:spPr>
-        <p:txBody>
-          <a:bodyPr wrap="square">
-            <a:spAutoFit/>
-          </a:bodyPr>
-          <a:lstStyle/>
-          <a:p>
-            <a:r>
-              <a:rPr lang="es-AR" sz="2000" dirty="0" smtClean="0">
-                <a:latin typeface="Georgia" panose="02040502050405020303" pitchFamily="18" charset="0"/>
-              </a:rPr>
-              <a:t>Actor: </a:t>
-            </a:r>
-            <a:r>
-              <a:rPr lang="es-AR" sz="2000" b="1" dirty="0" smtClean="0">
-                <a:latin typeface="Georgia" panose="02040502050405020303" pitchFamily="18" charset="0"/>
-              </a:rPr>
-              <a:t>Invitado</a:t>
-            </a:r>
-            <a:endParaRPr lang="es-AR" sz="2000" b="1" dirty="0">
-              <a:latin typeface="Georgia" panose="02040502050405020303" pitchFamily="18" charset="0"/>
-            </a:endParaRPr>
-          </a:p>
-        </p:txBody>
-      </p:sp>
     </p:spTree>
     <p:extLst>
       <p:ext uri="{BB962C8B-B14F-4D97-AF65-F5344CB8AC3E}">
@@ -10499,13 +10079,6 @@
   <p:clrMapOvr>
     <a:masterClrMapping/>
   </p:clrMapOvr>
-  <p:timing>
-    <p:tnLst>
-      <p:par>
-        <p:cTn id="1" dur="indefinite" restart="never" nodeType="tmRoot"/>
-      </p:par>
-    </p:tnLst>
-  </p:timing>
 </p:sld>
 </file>
 

</xml_diff>